<commit_message>
Final presentation and report update
</commit_message>
<xml_diff>
--- a/Progress Presentation/team48progressreport.pptx
+++ b/Progress Presentation/team48progressreport.pptx
@@ -4,6 +4,9 @@
   <p:sldMasterIdLst>
     <p:sldMasterId id="2147483684" r:id="rId1"/>
   </p:sldMasterIdLst>
+  <p:notesMasterIdLst>
+    <p:notesMasterId r:id="rId20"/>
+  </p:notesMasterIdLst>
   <p:sldIdLst>
     <p:sldId id="256" r:id="rId2"/>
     <p:sldId id="257" r:id="rId3"/>
@@ -20,9 +23,9 @@
     <p:sldId id="277" r:id="rId14"/>
     <p:sldId id="269" r:id="rId15"/>
     <p:sldId id="272" r:id="rId16"/>
-    <p:sldId id="273" r:id="rId17"/>
-    <p:sldId id="274" r:id="rId18"/>
-    <p:sldId id="275" r:id="rId19"/>
+    <p:sldId id="274" r:id="rId17"/>
+    <p:sldId id="275" r:id="rId18"/>
+    <p:sldId id="278" r:id="rId19"/>
   </p:sldIdLst>
   <p:sldSz cx="12192000" cy="6858000"/>
   <p:notesSz cx="6858000" cy="9144000"/>
@@ -129,6 +132,439 @@
 </p:presentation>
 </file>
 
+<file path=ppt/notesMasters/notesMaster1.xml><?xml version="1.0" encoding="utf-8"?>
+<p:notesMaster xmlns:a="http://schemas.openxmlformats.org/drawingml/2006/main" xmlns:r="http://schemas.openxmlformats.org/officeDocument/2006/relationships" xmlns:p="http://schemas.openxmlformats.org/presentationml/2006/main">
+  <p:cSld>
+    <p:bg>
+      <p:bgRef idx="1001">
+        <a:schemeClr val="bg1"/>
+      </p:bgRef>
+    </p:bg>
+    <p:spTree>
+      <p:nvGrpSpPr>
+        <p:cNvPr id="1" name=""/>
+        <p:cNvGrpSpPr/>
+        <p:nvPr/>
+      </p:nvGrpSpPr>
+      <p:grpSpPr>
+        <a:xfrm>
+          <a:off x="0" y="0"/>
+          <a:ext cx="0" cy="0"/>
+          <a:chOff x="0" y="0"/>
+          <a:chExt cx="0" cy="0"/>
+        </a:xfrm>
+      </p:grpSpPr>
+      <p:sp>
+        <p:nvSpPr>
+          <p:cNvPr id="2" name="Header Placeholder 1"/>
+          <p:cNvSpPr>
+            <a:spLocks noGrp="1"/>
+          </p:cNvSpPr>
+          <p:nvPr>
+            <p:ph type="hdr" sz="quarter"/>
+          </p:nvPr>
+        </p:nvSpPr>
+        <p:spPr>
+          <a:xfrm>
+            <a:off x="0" y="0"/>
+            <a:ext cx="2971800" cy="458788"/>
+          </a:xfrm>
+          <a:prstGeom prst="rect">
+            <a:avLst/>
+          </a:prstGeom>
+        </p:spPr>
+        <p:txBody>
+          <a:bodyPr vert="horz" lIns="91440" tIns="45720" rIns="91440" bIns="45720" rtlCol="0"/>
+          <a:lstStyle>
+            <a:lvl1pPr algn="l">
+              <a:defRPr sz="1200"/>
+            </a:lvl1pPr>
+          </a:lstStyle>
+          <a:p>
+            <a:endParaRPr lang="en-US"/>
+          </a:p>
+        </p:txBody>
+      </p:sp>
+      <p:sp>
+        <p:nvSpPr>
+          <p:cNvPr id="3" name="Date Placeholder 2"/>
+          <p:cNvSpPr>
+            <a:spLocks noGrp="1"/>
+          </p:cNvSpPr>
+          <p:nvPr>
+            <p:ph type="dt" idx="1"/>
+          </p:nvPr>
+        </p:nvSpPr>
+        <p:spPr>
+          <a:xfrm>
+            <a:off x="3884613" y="0"/>
+            <a:ext cx="2971800" cy="458788"/>
+          </a:xfrm>
+          <a:prstGeom prst="rect">
+            <a:avLst/>
+          </a:prstGeom>
+        </p:spPr>
+        <p:txBody>
+          <a:bodyPr vert="horz" lIns="91440" tIns="45720" rIns="91440" bIns="45720" rtlCol="0"/>
+          <a:lstStyle>
+            <a:lvl1pPr algn="r">
+              <a:defRPr sz="1200"/>
+            </a:lvl1pPr>
+          </a:lstStyle>
+          <a:p>
+            <a:fld id="{D854E5A2-560F-5042-B033-2870576C7FEE}" type="datetimeFigureOut">
+              <a:rPr lang="en-US" smtClean="0"/>
+              <a:t>10/30/22</a:t>
+            </a:fld>
+            <a:endParaRPr lang="en-US"/>
+          </a:p>
+        </p:txBody>
+      </p:sp>
+      <p:sp>
+        <p:nvSpPr>
+          <p:cNvPr id="4" name="Slide Image Placeholder 3"/>
+          <p:cNvSpPr>
+            <a:spLocks noGrp="1" noRot="1" noChangeAspect="1"/>
+          </p:cNvSpPr>
+          <p:nvPr>
+            <p:ph type="sldImg" idx="2"/>
+          </p:nvPr>
+        </p:nvSpPr>
+        <p:spPr>
+          <a:xfrm>
+            <a:off x="685800" y="1143000"/>
+            <a:ext cx="5486400" cy="3086100"/>
+          </a:xfrm>
+          <a:prstGeom prst="rect">
+            <a:avLst/>
+          </a:prstGeom>
+          <a:noFill/>
+          <a:ln w="12700">
+            <a:solidFill>
+              <a:prstClr val="black"/>
+            </a:solidFill>
+          </a:ln>
+        </p:spPr>
+        <p:txBody>
+          <a:bodyPr vert="horz" lIns="91440" tIns="45720" rIns="91440" bIns="45720" rtlCol="0" anchor="ctr"/>
+          <a:lstStyle/>
+          <a:p>
+            <a:endParaRPr lang="en-US"/>
+          </a:p>
+        </p:txBody>
+      </p:sp>
+      <p:sp>
+        <p:nvSpPr>
+          <p:cNvPr id="5" name="Notes Placeholder 4"/>
+          <p:cNvSpPr>
+            <a:spLocks noGrp="1"/>
+          </p:cNvSpPr>
+          <p:nvPr>
+            <p:ph type="body" sz="quarter" idx="3"/>
+          </p:nvPr>
+        </p:nvSpPr>
+        <p:spPr>
+          <a:xfrm>
+            <a:off x="685800" y="4400550"/>
+            <a:ext cx="5486400" cy="3600450"/>
+          </a:xfrm>
+          <a:prstGeom prst="rect">
+            <a:avLst/>
+          </a:prstGeom>
+        </p:spPr>
+        <p:txBody>
+          <a:bodyPr vert="horz" lIns="91440" tIns="45720" rIns="91440" bIns="45720" rtlCol="0"/>
+          <a:lstStyle/>
+          <a:p>
+            <a:pPr lvl="0"/>
+            <a:r>
+              <a:rPr lang="en-US"/>
+              <a:t>Click to edit Master text styles</a:t>
+            </a:r>
+          </a:p>
+          <a:p>
+            <a:pPr lvl="1"/>
+            <a:r>
+              <a:rPr lang="en-US"/>
+              <a:t>Second level</a:t>
+            </a:r>
+          </a:p>
+          <a:p>
+            <a:pPr lvl="2"/>
+            <a:r>
+              <a:rPr lang="en-US"/>
+              <a:t>Third level</a:t>
+            </a:r>
+          </a:p>
+          <a:p>
+            <a:pPr lvl="3"/>
+            <a:r>
+              <a:rPr lang="en-US"/>
+              <a:t>Fourth level</a:t>
+            </a:r>
+          </a:p>
+          <a:p>
+            <a:pPr lvl="4"/>
+            <a:r>
+              <a:rPr lang="en-US"/>
+              <a:t>Fifth level</a:t>
+            </a:r>
+          </a:p>
+        </p:txBody>
+      </p:sp>
+      <p:sp>
+        <p:nvSpPr>
+          <p:cNvPr id="6" name="Footer Placeholder 5"/>
+          <p:cNvSpPr>
+            <a:spLocks noGrp="1"/>
+          </p:cNvSpPr>
+          <p:nvPr>
+            <p:ph type="ftr" sz="quarter" idx="4"/>
+          </p:nvPr>
+        </p:nvSpPr>
+        <p:spPr>
+          <a:xfrm>
+            <a:off x="0" y="8685213"/>
+            <a:ext cx="2971800" cy="458787"/>
+          </a:xfrm>
+          <a:prstGeom prst="rect">
+            <a:avLst/>
+          </a:prstGeom>
+        </p:spPr>
+        <p:txBody>
+          <a:bodyPr vert="horz" lIns="91440" tIns="45720" rIns="91440" bIns="45720" rtlCol="0" anchor="b"/>
+          <a:lstStyle>
+            <a:lvl1pPr algn="l">
+              <a:defRPr sz="1200"/>
+            </a:lvl1pPr>
+          </a:lstStyle>
+          <a:p>
+            <a:endParaRPr lang="en-US"/>
+          </a:p>
+        </p:txBody>
+      </p:sp>
+      <p:sp>
+        <p:nvSpPr>
+          <p:cNvPr id="7" name="Slide Number Placeholder 6"/>
+          <p:cNvSpPr>
+            <a:spLocks noGrp="1"/>
+          </p:cNvSpPr>
+          <p:nvPr>
+            <p:ph type="sldNum" sz="quarter" idx="5"/>
+          </p:nvPr>
+        </p:nvSpPr>
+        <p:spPr>
+          <a:xfrm>
+            <a:off x="3884613" y="8685213"/>
+            <a:ext cx="2971800" cy="458787"/>
+          </a:xfrm>
+          <a:prstGeom prst="rect">
+            <a:avLst/>
+          </a:prstGeom>
+        </p:spPr>
+        <p:txBody>
+          <a:bodyPr vert="horz" lIns="91440" tIns="45720" rIns="91440" bIns="45720" rtlCol="0" anchor="b"/>
+          <a:lstStyle>
+            <a:lvl1pPr algn="r">
+              <a:defRPr sz="1200"/>
+            </a:lvl1pPr>
+          </a:lstStyle>
+          <a:p>
+            <a:fld id="{AE3325B4-BEFF-9046-A95C-9488231697A5}" type="slidenum">
+              <a:rPr lang="en-US" smtClean="0"/>
+              <a:t>‹#›</a:t>
+            </a:fld>
+            <a:endParaRPr lang="en-US"/>
+          </a:p>
+        </p:txBody>
+      </p:sp>
+    </p:spTree>
+    <p:extLst>
+      <p:ext uri="{BB962C8B-B14F-4D97-AF65-F5344CB8AC3E}">
+        <p14:creationId xmlns:p14="http://schemas.microsoft.com/office/powerpoint/2010/main" val="3080228794"/>
+      </p:ext>
+    </p:extLst>
+  </p:cSld>
+  <p:clrMap bg1="lt1" tx1="dk1" bg2="lt2" tx2="dk2" accent1="accent1" accent2="accent2" accent3="accent3" accent4="accent4" accent5="accent5" accent6="accent6" hlink="hlink" folHlink="folHlink"/>
+  <p:notesStyle>
+    <a:lvl1pPr marL="0" algn="l" defTabSz="914400" rtl="0" eaLnBrk="1" latinLnBrk="0" hangingPunct="1">
+      <a:defRPr sz="1200" kern="1200">
+        <a:solidFill>
+          <a:schemeClr val="tx1"/>
+        </a:solidFill>
+        <a:latin typeface="+mn-lt"/>
+        <a:ea typeface="+mn-ea"/>
+        <a:cs typeface="+mn-cs"/>
+      </a:defRPr>
+    </a:lvl1pPr>
+    <a:lvl2pPr marL="457200" algn="l" defTabSz="914400" rtl="0" eaLnBrk="1" latinLnBrk="0" hangingPunct="1">
+      <a:defRPr sz="1200" kern="1200">
+        <a:solidFill>
+          <a:schemeClr val="tx1"/>
+        </a:solidFill>
+        <a:latin typeface="+mn-lt"/>
+        <a:ea typeface="+mn-ea"/>
+        <a:cs typeface="+mn-cs"/>
+      </a:defRPr>
+    </a:lvl2pPr>
+    <a:lvl3pPr marL="914400" algn="l" defTabSz="914400" rtl="0" eaLnBrk="1" latinLnBrk="0" hangingPunct="1">
+      <a:defRPr sz="1200" kern="1200">
+        <a:solidFill>
+          <a:schemeClr val="tx1"/>
+        </a:solidFill>
+        <a:latin typeface="+mn-lt"/>
+        <a:ea typeface="+mn-ea"/>
+        <a:cs typeface="+mn-cs"/>
+      </a:defRPr>
+    </a:lvl3pPr>
+    <a:lvl4pPr marL="1371600" algn="l" defTabSz="914400" rtl="0" eaLnBrk="1" latinLnBrk="0" hangingPunct="1">
+      <a:defRPr sz="1200" kern="1200">
+        <a:solidFill>
+          <a:schemeClr val="tx1"/>
+        </a:solidFill>
+        <a:latin typeface="+mn-lt"/>
+        <a:ea typeface="+mn-ea"/>
+        <a:cs typeface="+mn-cs"/>
+      </a:defRPr>
+    </a:lvl4pPr>
+    <a:lvl5pPr marL="1828800" algn="l" defTabSz="914400" rtl="0" eaLnBrk="1" latinLnBrk="0" hangingPunct="1">
+      <a:defRPr sz="1200" kern="1200">
+        <a:solidFill>
+          <a:schemeClr val="tx1"/>
+        </a:solidFill>
+        <a:latin typeface="+mn-lt"/>
+        <a:ea typeface="+mn-ea"/>
+        <a:cs typeface="+mn-cs"/>
+      </a:defRPr>
+    </a:lvl5pPr>
+    <a:lvl6pPr marL="2286000" algn="l" defTabSz="914400" rtl="0" eaLnBrk="1" latinLnBrk="0" hangingPunct="1">
+      <a:defRPr sz="1200" kern="1200">
+        <a:solidFill>
+          <a:schemeClr val="tx1"/>
+        </a:solidFill>
+        <a:latin typeface="+mn-lt"/>
+        <a:ea typeface="+mn-ea"/>
+        <a:cs typeface="+mn-cs"/>
+      </a:defRPr>
+    </a:lvl6pPr>
+    <a:lvl7pPr marL="2743200" algn="l" defTabSz="914400" rtl="0" eaLnBrk="1" latinLnBrk="0" hangingPunct="1">
+      <a:defRPr sz="1200" kern="1200">
+        <a:solidFill>
+          <a:schemeClr val="tx1"/>
+        </a:solidFill>
+        <a:latin typeface="+mn-lt"/>
+        <a:ea typeface="+mn-ea"/>
+        <a:cs typeface="+mn-cs"/>
+      </a:defRPr>
+    </a:lvl7pPr>
+    <a:lvl8pPr marL="3200400" algn="l" defTabSz="914400" rtl="0" eaLnBrk="1" latinLnBrk="0" hangingPunct="1">
+      <a:defRPr sz="1200" kern="1200">
+        <a:solidFill>
+          <a:schemeClr val="tx1"/>
+        </a:solidFill>
+        <a:latin typeface="+mn-lt"/>
+        <a:ea typeface="+mn-ea"/>
+        <a:cs typeface="+mn-cs"/>
+      </a:defRPr>
+    </a:lvl8pPr>
+    <a:lvl9pPr marL="3657600" algn="l" defTabSz="914400" rtl="0" eaLnBrk="1" latinLnBrk="0" hangingPunct="1">
+      <a:defRPr sz="1200" kern="1200">
+        <a:solidFill>
+          <a:schemeClr val="tx1"/>
+        </a:solidFill>
+        <a:latin typeface="+mn-lt"/>
+        <a:ea typeface="+mn-ea"/>
+        <a:cs typeface="+mn-cs"/>
+      </a:defRPr>
+    </a:lvl9pPr>
+  </p:notesStyle>
+</p:notesMaster>
+</file>
+
+<file path=ppt/notesSlides/notesSlide1.xml><?xml version="1.0" encoding="utf-8"?>
+<p:notes xmlns:a="http://schemas.openxmlformats.org/drawingml/2006/main" xmlns:r="http://schemas.openxmlformats.org/officeDocument/2006/relationships" xmlns:p="http://schemas.openxmlformats.org/presentationml/2006/main">
+  <p:cSld>
+    <p:spTree>
+      <p:nvGrpSpPr>
+        <p:cNvPr id="1" name=""/>
+        <p:cNvGrpSpPr/>
+        <p:nvPr/>
+      </p:nvGrpSpPr>
+      <p:grpSpPr>
+        <a:xfrm>
+          <a:off x="0" y="0"/>
+          <a:ext cx="0" cy="0"/>
+          <a:chOff x="0" y="0"/>
+          <a:chExt cx="0" cy="0"/>
+        </a:xfrm>
+      </p:grpSpPr>
+      <p:sp>
+        <p:nvSpPr>
+          <p:cNvPr id="2" name="Slide Image Placeholder 1"/>
+          <p:cNvSpPr>
+            <a:spLocks noGrp="1" noRot="1" noChangeAspect="1"/>
+          </p:cNvSpPr>
+          <p:nvPr>
+            <p:ph type="sldImg"/>
+          </p:nvPr>
+        </p:nvSpPr>
+        <p:spPr/>
+      </p:sp>
+      <p:sp>
+        <p:nvSpPr>
+          <p:cNvPr id="3" name="Notes Placeholder 2"/>
+          <p:cNvSpPr>
+            <a:spLocks noGrp="1"/>
+          </p:cNvSpPr>
+          <p:nvPr>
+            <p:ph type="body" idx="1"/>
+          </p:nvPr>
+        </p:nvSpPr>
+        <p:spPr/>
+        <p:txBody>
+          <a:bodyPr/>
+          <a:lstStyle/>
+          <a:p>
+            <a:endParaRPr lang="en-US" dirty="0"/>
+          </a:p>
+        </p:txBody>
+      </p:sp>
+      <p:sp>
+        <p:nvSpPr>
+          <p:cNvPr id="4" name="Slide Number Placeholder 3"/>
+          <p:cNvSpPr>
+            <a:spLocks noGrp="1"/>
+          </p:cNvSpPr>
+          <p:nvPr>
+            <p:ph type="sldNum" sz="quarter" idx="5"/>
+          </p:nvPr>
+        </p:nvSpPr>
+        <p:spPr/>
+        <p:txBody>
+          <a:bodyPr/>
+          <a:lstStyle/>
+          <a:p>
+            <a:fld id="{AE3325B4-BEFF-9046-A95C-9488231697A5}" type="slidenum">
+              <a:rPr lang="en-US" smtClean="0"/>
+              <a:t>2</a:t>
+            </a:fld>
+            <a:endParaRPr lang="en-US"/>
+          </a:p>
+        </p:txBody>
+      </p:sp>
+    </p:spTree>
+    <p:extLst>
+      <p:ext uri="{BB962C8B-B14F-4D97-AF65-F5344CB8AC3E}">
+        <p14:creationId xmlns:p14="http://schemas.microsoft.com/office/powerpoint/2010/main" val="2738424694"/>
+      </p:ext>
+    </p:extLst>
+  </p:cSld>
+  <p:clrMapOvr>
+    <a:masterClrMapping/>
+  </p:clrMapOvr>
+</p:notes>
+</file>
+
 <file path=ppt/slideLayouts/slideLayout1.xml><?xml version="1.0" encoding="utf-8"?>
 <p:sldLayout xmlns:a="http://schemas.openxmlformats.org/drawingml/2006/main" xmlns:r="http://schemas.openxmlformats.org/officeDocument/2006/relationships" xmlns:p="http://schemas.openxmlformats.org/presentationml/2006/main" type="title" preserve="1">
   <p:cSld name="Title Slide">
@@ -276,7 +712,7 @@
           <a:p>
             <a:fld id="{9893EBB2-0F16-174A-81ED-0C7E96A52E91}" type="datetimeFigureOut">
               <a:rPr lang="en-US" smtClean="0"/>
-              <a:t>10/29/22</a:t>
+              <a:t>10/30/22</a:t>
             </a:fld>
             <a:endParaRPr lang="en-US"/>
           </a:p>
@@ -474,7 +910,7 @@
           <a:p>
             <a:fld id="{9893EBB2-0F16-174A-81ED-0C7E96A52E91}" type="datetimeFigureOut">
               <a:rPr lang="en-US" smtClean="0"/>
-              <a:t>10/29/22</a:t>
+              <a:t>10/30/22</a:t>
             </a:fld>
             <a:endParaRPr lang="en-US"/>
           </a:p>
@@ -682,7 +1118,7 @@
           <a:p>
             <a:fld id="{9893EBB2-0F16-174A-81ED-0C7E96A52E91}" type="datetimeFigureOut">
               <a:rPr lang="en-US" smtClean="0"/>
-              <a:t>10/29/22</a:t>
+              <a:t>10/30/22</a:t>
             </a:fld>
             <a:endParaRPr lang="en-US"/>
           </a:p>
@@ -935,7 +1371,7 @@
           <a:p>
             <a:fld id="{9893EBB2-0F16-174A-81ED-0C7E96A52E91}" type="datetimeFigureOut">
               <a:rPr lang="en-US" smtClean="0"/>
-              <a:t>10/29/22</a:t>
+              <a:t>10/30/22</a:t>
             </a:fld>
             <a:endParaRPr lang="en-US"/>
           </a:p>
@@ -1210,7 +1646,7 @@
           <a:p>
             <a:fld id="{9893EBB2-0F16-174A-81ED-0C7E96A52E91}" type="datetimeFigureOut">
               <a:rPr lang="en-US" smtClean="0"/>
-              <a:t>10/29/22</a:t>
+              <a:t>10/30/22</a:t>
             </a:fld>
             <a:endParaRPr lang="en-US"/>
           </a:p>
@@ -1530,7 +1966,7 @@
           <a:p>
             <a:fld id="{9893EBB2-0F16-174A-81ED-0C7E96A52E91}" type="datetimeFigureOut">
               <a:rPr lang="en-US" smtClean="0"/>
-              <a:t>10/29/22</a:t>
+              <a:t>10/30/22</a:t>
             </a:fld>
             <a:endParaRPr lang="en-US"/>
           </a:p>
@@ -1942,7 +2378,7 @@
           <a:p>
             <a:fld id="{9893EBB2-0F16-174A-81ED-0C7E96A52E91}" type="datetimeFigureOut">
               <a:rPr lang="en-US" smtClean="0"/>
-              <a:t>10/29/22</a:t>
+              <a:t>10/30/22</a:t>
             </a:fld>
             <a:endParaRPr lang="en-US"/>
           </a:p>
@@ -2083,7 +2519,7 @@
           <a:p>
             <a:fld id="{9893EBB2-0F16-174A-81ED-0C7E96A52E91}" type="datetimeFigureOut">
               <a:rPr lang="en-US" smtClean="0"/>
-              <a:t>10/29/22</a:t>
+              <a:t>10/30/22</a:t>
             </a:fld>
             <a:endParaRPr lang="en-US"/>
           </a:p>
@@ -2196,7 +2632,7 @@
           <a:p>
             <a:fld id="{9893EBB2-0F16-174A-81ED-0C7E96A52E91}" type="datetimeFigureOut">
               <a:rPr lang="en-US" smtClean="0"/>
-              <a:t>10/29/22</a:t>
+              <a:t>10/30/22</a:t>
             </a:fld>
             <a:endParaRPr lang="en-US"/>
           </a:p>
@@ -2507,7 +2943,7 @@
           <a:p>
             <a:fld id="{9893EBB2-0F16-174A-81ED-0C7E96A52E91}" type="datetimeFigureOut">
               <a:rPr lang="en-US" smtClean="0"/>
-              <a:t>10/29/22</a:t>
+              <a:t>10/30/22</a:t>
             </a:fld>
             <a:endParaRPr lang="en-US"/>
           </a:p>
@@ -2795,7 +3231,7 @@
           <a:p>
             <a:fld id="{9893EBB2-0F16-174A-81ED-0C7E96A52E91}" type="datetimeFigureOut">
               <a:rPr lang="en-US" smtClean="0"/>
-              <a:t>10/29/22</a:t>
+              <a:t>10/30/22</a:t>
             </a:fld>
             <a:endParaRPr lang="en-US"/>
           </a:p>
@@ -3036,7 +3472,7 @@
           <a:p>
             <a:fld id="{9893EBB2-0F16-174A-81ED-0C7E96A52E91}" type="datetimeFigureOut">
               <a:rPr lang="en-US" smtClean="0"/>
-              <a:t>10/29/22</a:t>
+              <a:t>10/30/22</a:t>
             </a:fld>
             <a:endParaRPr lang="en-US"/>
           </a:p>
@@ -3631,6 +4067,36 @@
           <a:chExt cx="0" cy="0"/>
         </a:xfrm>
       </p:grpSpPr>
+      <p:pic>
+        <p:nvPicPr>
+          <p:cNvPr id="6" name="Picture 5" descr="A picture containing timeline&#10;&#10;Description automatically generated">
+            <a:extLst>
+              <a:ext uri="{FF2B5EF4-FFF2-40B4-BE49-F238E27FC236}">
+                <a16:creationId xmlns:a16="http://schemas.microsoft.com/office/drawing/2014/main" id="{39C9E376-18BF-679F-1720-44B6656F8649}"/>
+              </a:ext>
+            </a:extLst>
+          </p:cNvPr>
+          <p:cNvPicPr>
+            <a:picLocks noChangeAspect="1"/>
+          </p:cNvPicPr>
+          <p:nvPr/>
+        </p:nvPicPr>
+        <p:blipFill>
+          <a:blip r:embed="rId2"/>
+          <a:stretch>
+            <a:fillRect/>
+          </a:stretch>
+        </p:blipFill>
+        <p:spPr>
+          <a:xfrm>
+            <a:off x="1285100" y="2058666"/>
+            <a:ext cx="9564127" cy="3615274"/>
+          </a:xfrm>
+          <a:prstGeom prst="rect">
+            <a:avLst/>
+          </a:prstGeom>
+        </p:spPr>
+      </p:pic>
       <p:sp>
         <p:nvSpPr>
           <p:cNvPr id="2" name="Title 1">
@@ -3661,35 +4127,6 @@
           </a:p>
         </p:txBody>
       </p:sp>
-      <p:pic>
-        <p:nvPicPr>
-          <p:cNvPr id="9" name="Picture 8">
-            <a:extLst>
-              <a:ext uri="{FF2B5EF4-FFF2-40B4-BE49-F238E27FC236}">
-                <a16:creationId xmlns:a16="http://schemas.microsoft.com/office/drawing/2014/main" id="{FC954E38-8E91-5F10-6F90-2341CDA9647D}"/>
-              </a:ext>
-            </a:extLst>
-          </p:cNvPr>
-          <p:cNvPicPr>
-            <a:picLocks noChangeAspect="1"/>
-          </p:cNvPicPr>
-          <p:nvPr/>
-        </p:nvPicPr>
-        <p:blipFill rotWithShape="1">
-          <a:blip r:embed="rId2"/>
-          <a:srcRect b="23664"/>
-          <a:stretch/>
-        </p:blipFill>
-        <p:spPr>
-          <a:xfrm>
-            <a:off x="1110927" y="2178175"/>
-            <a:ext cx="9970145" cy="3547578"/>
-          </a:xfrm>
-          <a:prstGeom prst="rect">
-            <a:avLst/>
-          </a:prstGeom>
-        </p:spPr>
-      </p:pic>
       <p:cxnSp>
         <p:nvCxnSpPr>
           <p:cNvPr id="11" name="Straight Connector 10">
@@ -3869,7 +4306,7 @@
           <a:p>
             <a:r>
               <a:rPr lang="en-US" dirty="0"/>
-              <a:t>We’re on track to have modeling complete in two weeks, allowing an additional week to iterate as-needed and develop our final report.</a:t>
+              <a:t>We’re on track to have modeling complete in two weeks, allowing an additional week to iterate as-needed and develop our final report</a:t>
             </a:r>
           </a:p>
         </p:txBody>
@@ -4112,7 +4549,7 @@
         <p:spPr>
           <a:xfrm>
             <a:off x="967946" y="2807170"/>
-            <a:ext cx="3484606" cy="3046988"/>
+            <a:ext cx="3484606" cy="3954929"/>
           </a:xfrm>
           <a:prstGeom prst="rect">
             <a:avLst/>
@@ -4173,7 +4610,7 @@
             </a:pPr>
             <a:r>
               <a:rPr lang="en-US" dirty="0"/>
-              <a:t>Removed duplicate rows</a:t>
+              <a:t>Removed duplicate rows from real estate data</a:t>
             </a:r>
           </a:p>
           <a:p>
@@ -4200,6 +4637,19 @@
             <a:r>
               <a:rPr lang="en-US" dirty="0"/>
               <a:t>Aggregated income tax data</a:t>
+            </a:r>
+          </a:p>
+          <a:p>
+            <a:pPr marL="285750" indent="-285750">
+              <a:spcAft>
+                <a:spcPts val="600"/>
+              </a:spcAft>
+              <a:buFont typeface="Arial" panose="020B0604020202020204" pitchFamily="34" charset="0"/>
+              <a:buChar char="•"/>
+            </a:pPr>
+            <a:r>
+              <a:rPr lang="en-US" dirty="0"/>
+              <a:t>Joined the real estate and income tax datasets</a:t>
             </a:r>
           </a:p>
           <a:p>
@@ -7867,7 +8317,7 @@
         <p:spPr>
           <a:xfrm>
             <a:off x="967946" y="2792628"/>
-            <a:ext cx="3484606" cy="3016210"/>
+            <a:ext cx="3484606" cy="2739211"/>
           </a:xfrm>
           <a:prstGeom prst="rect">
             <a:avLst/>
@@ -7880,12 +8330,12 @@
           </a:bodyPr>
           <a:lstStyle/>
           <a:p>
-            <a:pPr marL="285750" indent="-285750">
+            <a:pPr marL="342900" indent="-342900">
               <a:spcAft>
                 <a:spcPts val="600"/>
               </a:spcAft>
-              <a:buFont typeface="Arial" panose="020B0604020202020204" pitchFamily="34" charset="0"/>
-              <a:buChar char="•"/>
+              <a:buFont typeface="+mj-lt"/>
+              <a:buAutoNum type="arabicPeriod"/>
             </a:pPr>
             <a:r>
               <a:rPr lang="en-US" dirty="0"/>
@@ -7893,12 +8343,12 @@
             </a:r>
           </a:p>
           <a:p>
-            <a:pPr marL="285750" indent="-285750">
+            <a:pPr marL="342900" indent="-342900">
               <a:spcAft>
                 <a:spcPts val="600"/>
               </a:spcAft>
-              <a:buFont typeface="Arial" panose="020B0604020202020204" pitchFamily="34" charset="0"/>
-              <a:buChar char="•"/>
+              <a:buFont typeface="+mj-lt"/>
+              <a:buAutoNum type="arabicPeriod"/>
             </a:pPr>
             <a:r>
               <a:rPr lang="en-US" dirty="0">
@@ -7915,7 +8365,25 @@
                 <a:ea typeface="MS Mincho" panose="02020609040205080304" pitchFamily="49" charset="-128"/>
                 <a:cs typeface="Times New Roman" panose="02020603050405020304" pitchFamily="18" charset="0"/>
               </a:rPr>
-              <a:t>nvestigated the relationship between the features and the DV using </a:t>
+              <a:t>nvestigated feature/DV </a:t>
+            </a:r>
+            <a:r>
+              <a:rPr lang="en-US" sz="1800" dirty="0" err="1">
+                <a:effectLst/>
+                <a:latin typeface="Calibri" panose="020F0502020204030204" pitchFamily="34" charset="0"/>
+                <a:ea typeface="MS Mincho" panose="02020609040205080304" pitchFamily="49" charset="-128"/>
+                <a:cs typeface="Times New Roman" panose="02020603050405020304" pitchFamily="18" charset="0"/>
+              </a:rPr>
+              <a:t>relatioships</a:t>
+            </a:r>
+            <a:r>
+              <a:rPr lang="en-US" sz="1800" dirty="0">
+                <a:effectLst/>
+                <a:latin typeface="Calibri" panose="020F0502020204030204" pitchFamily="34" charset="0"/>
+                <a:ea typeface="MS Mincho" panose="02020609040205080304" pitchFamily="49" charset="-128"/>
+                <a:cs typeface="Times New Roman" panose="02020603050405020304" pitchFamily="18" charset="0"/>
+              </a:rPr>
+              <a:t> using </a:t>
             </a:r>
             <a:r>
               <a:rPr lang="en-US" sz="1800" dirty="0" err="1">
@@ -7933,16 +8401,16 @@
                 <a:ea typeface="MS Mincho" panose="02020609040205080304" pitchFamily="49" charset="-128"/>
                 <a:cs typeface="Times New Roman" panose="02020603050405020304" pitchFamily="18" charset="0"/>
               </a:rPr>
-              <a:t> and correlation plots</a:t>
-            </a:r>
-          </a:p>
-          <a:p>
-            <a:pPr marL="285750" indent="-285750">
+              <a:t> and correlation</a:t>
+            </a:r>
+          </a:p>
+          <a:p>
+            <a:pPr marL="342900" indent="-342900">
               <a:spcAft>
                 <a:spcPts val="600"/>
               </a:spcAft>
-              <a:buFont typeface="Arial" panose="020B0604020202020204" pitchFamily="34" charset="0"/>
-              <a:buChar char="•"/>
+              <a:buFont typeface="+mj-lt"/>
+              <a:buAutoNum type="arabicPeriod"/>
             </a:pPr>
             <a:r>
               <a:rPr lang="en-US" dirty="0">
@@ -7986,7 +8454,7 @@
         <p:spPr>
           <a:xfrm>
             <a:off x="4790303" y="2483708"/>
-            <a:ext cx="6911546" cy="308920"/>
+            <a:ext cx="4180702" cy="308920"/>
           </a:xfrm>
           <a:prstGeom prst="rect">
             <a:avLst/>
@@ -8051,8 +8519,8 @@
         </p:nvSpPr>
         <p:spPr>
           <a:xfrm>
-            <a:off x="4790303" y="3127545"/>
-            <a:ext cx="7010400" cy="1908215"/>
+            <a:off x="4790303" y="2792628"/>
+            <a:ext cx="4370173" cy="2739211"/>
           </a:xfrm>
           <a:prstGeom prst="rect">
             <a:avLst/>
@@ -8087,7 +8555,7 @@
             </a:pPr>
             <a:r>
               <a:rPr lang="en-US" dirty="0"/>
-              <a:t>Investigate of correlation between price and income tax features reveals limited linear signal</a:t>
+              <a:t>Investigation of correlation between price and income tax features reveals limited linear signal</a:t>
             </a:r>
           </a:p>
           <a:p>
@@ -8105,7 +8573,7 @@
                 <a:ea typeface="MS Mincho" panose="02020609040205080304" pitchFamily="49" charset="-128"/>
                 <a:cs typeface="Times New Roman" panose="02020603050405020304" pitchFamily="18" charset="0"/>
               </a:rPr>
-              <a:t>Evaluation of multicollinearity showed many places with correlation between predictors, particularly in the income tax dataset</a:t>
+              <a:t>Evaluation of multicollinearity showed many places with correlation between predictors</a:t>
             </a:r>
             <a:endParaRPr lang="en-US" sz="1800" dirty="0">
               <a:effectLst/>
@@ -8774,6 +9242,184 @@
           </p:txBody>
         </p:sp>
       </p:grpSp>
+      <p:pic>
+        <p:nvPicPr>
+          <p:cNvPr id="15" name="Picture 14" descr="Chart&#10;&#10;Description automatically generated">
+            <a:extLst>
+              <a:ext uri="{FF2B5EF4-FFF2-40B4-BE49-F238E27FC236}">
+                <a16:creationId xmlns:a16="http://schemas.microsoft.com/office/drawing/2014/main" id="{BB2DAAF2-9291-3CAA-5BE2-FE1FB684364A}"/>
+              </a:ext>
+            </a:extLst>
+          </p:cNvPr>
+          <p:cNvPicPr>
+            <a:picLocks noChangeAspect="1"/>
+          </p:cNvPicPr>
+          <p:nvPr/>
+        </p:nvPicPr>
+        <p:blipFill>
+          <a:blip r:embed="rId2">
+            <a:extLst>
+              <a:ext uri="{28A0092B-C50C-407E-A947-70E740481C1C}">
+                <a14:useLocalDpi xmlns:a14="http://schemas.microsoft.com/office/drawing/2010/main" val="0"/>
+              </a:ext>
+            </a:extLst>
+          </a:blip>
+          <a:stretch>
+            <a:fillRect/>
+          </a:stretch>
+        </p:blipFill>
+        <p:spPr>
+          <a:xfrm>
+            <a:off x="9344997" y="3114250"/>
+            <a:ext cx="2535507" cy="2095966"/>
+          </a:xfrm>
+          <a:prstGeom prst="rect">
+            <a:avLst/>
+          </a:prstGeom>
+        </p:spPr>
+      </p:pic>
+      <p:sp>
+        <p:nvSpPr>
+          <p:cNvPr id="21" name="TextBox 20">
+            <a:extLst>
+              <a:ext uri="{FF2B5EF4-FFF2-40B4-BE49-F238E27FC236}">
+                <a16:creationId xmlns:a16="http://schemas.microsoft.com/office/drawing/2014/main" id="{A643C742-31A7-A89E-3DBD-2B3DA79B62BB}"/>
+              </a:ext>
+            </a:extLst>
+          </p:cNvPr>
+          <p:cNvSpPr txBox="1"/>
+          <p:nvPr/>
+        </p:nvSpPr>
+        <p:spPr>
+          <a:xfrm>
+            <a:off x="598459" y="5840758"/>
+            <a:ext cx="10585622" cy="907941"/>
+          </a:xfrm>
+          <a:prstGeom prst="rect">
+            <a:avLst/>
+          </a:prstGeom>
+          <a:noFill/>
+        </p:spPr>
+        <p:txBody>
+          <a:bodyPr wrap="square">
+            <a:spAutoFit/>
+          </a:bodyPr>
+          <a:lstStyle/>
+          <a:p>
+            <a:pPr marL="466725" indent="-466725">
+              <a:spcAft>
+                <a:spcPts val="300"/>
+              </a:spcAft>
+              <a:buFont typeface="Arial" panose="020B0604020202020204" pitchFamily="34" charset="0"/>
+              <a:buChar char="•"/>
+            </a:pPr>
+            <a:r>
+              <a:rPr lang="en-US" sz="1600" dirty="0"/>
+              <a:t>Real estate features are expected to provide the most signal to the model</a:t>
+            </a:r>
+          </a:p>
+          <a:p>
+            <a:pPr marL="466725" indent="-466725">
+              <a:spcAft>
+                <a:spcPts val="300"/>
+              </a:spcAft>
+              <a:buFont typeface="Arial" panose="020B0604020202020204" pitchFamily="34" charset="0"/>
+              <a:buChar char="•"/>
+            </a:pPr>
+            <a:r>
+              <a:rPr lang="en-US" sz="1600" dirty="0">
+                <a:latin typeface="Calibri" panose="020F0502020204030204" pitchFamily="34" charset="0"/>
+                <a:ea typeface="MS Mincho" panose="02020609040205080304" pitchFamily="49" charset="-128"/>
+                <a:cs typeface="Times New Roman" panose="02020603050405020304" pitchFamily="18" charset="0"/>
+              </a:rPr>
+              <a:t>T</a:t>
+            </a:r>
+            <a:r>
+              <a:rPr lang="en-US" sz="1600" dirty="0">
+                <a:effectLst/>
+                <a:latin typeface="Calibri" panose="020F0502020204030204" pitchFamily="34" charset="0"/>
+                <a:ea typeface="MS Mincho" panose="02020609040205080304" pitchFamily="49" charset="-128"/>
+                <a:cs typeface="Times New Roman" panose="02020603050405020304" pitchFamily="18" charset="0"/>
+              </a:rPr>
+              <a:t>ax </a:t>
+            </a:r>
+            <a:r>
+              <a:rPr lang="en-US" sz="1600" dirty="0"/>
+              <a:t>features related to affluency have the most potential to provide signal to the model</a:t>
+            </a:r>
+          </a:p>
+          <a:p>
+            <a:pPr marL="466725" indent="-466725">
+              <a:spcAft>
+                <a:spcPts val="300"/>
+              </a:spcAft>
+              <a:buFont typeface="Arial" panose="020B0604020202020204" pitchFamily="34" charset="0"/>
+              <a:buChar char="•"/>
+            </a:pPr>
+            <a:r>
+              <a:rPr lang="en-US" sz="1600" dirty="0"/>
+              <a:t>Tree-based models will likely far outperform linear models</a:t>
+            </a:r>
+          </a:p>
+        </p:txBody>
+      </p:sp>
+      <p:sp>
+        <p:nvSpPr>
+          <p:cNvPr id="22" name="Rectangle 21">
+            <a:extLst>
+              <a:ext uri="{FF2B5EF4-FFF2-40B4-BE49-F238E27FC236}">
+                <a16:creationId xmlns:a16="http://schemas.microsoft.com/office/drawing/2014/main" id="{75E80232-73A5-BFEA-2729-805389AC2A5C}"/>
+              </a:ext>
+            </a:extLst>
+          </p:cNvPr>
+          <p:cNvSpPr/>
+          <p:nvPr/>
+        </p:nvSpPr>
+        <p:spPr>
+          <a:xfrm>
+            <a:off x="0" y="5535958"/>
+            <a:ext cx="12192000" cy="304800"/>
+          </a:xfrm>
+          <a:prstGeom prst="rect">
+            <a:avLst/>
+          </a:prstGeom>
+          <a:solidFill>
+            <a:schemeClr val="tx2">
+              <a:lumMod val="60000"/>
+              <a:lumOff val="40000"/>
+            </a:schemeClr>
+          </a:solidFill>
+          <a:ln>
+            <a:noFill/>
+          </a:ln>
+        </p:spPr>
+        <p:style>
+          <a:lnRef idx="2">
+            <a:schemeClr val="accent1">
+              <a:shade val="50000"/>
+            </a:schemeClr>
+          </a:lnRef>
+          <a:fillRef idx="1">
+            <a:schemeClr val="accent1"/>
+          </a:fillRef>
+          <a:effectRef idx="0">
+            <a:schemeClr val="accent1"/>
+          </a:effectRef>
+          <a:fontRef idx="minor">
+            <a:schemeClr val="lt1"/>
+          </a:fontRef>
+        </p:style>
+        <p:txBody>
+          <a:bodyPr rtlCol="0" anchor="ctr"/>
+          <a:lstStyle/>
+          <a:p>
+            <a:r>
+              <a:rPr lang="en-US" dirty="0"/>
+              <a:t>INITIAL HYPOTHESES</a:t>
+            </a:r>
+          </a:p>
+        </p:txBody>
+      </p:sp>
     </p:spTree>
     <p:extLst>
       <p:ext uri="{BB962C8B-B14F-4D97-AF65-F5344CB8AC3E}">
@@ -8788,7 +9434,7 @@
 </file>
 
 <file path=ppt/slides/slide13.xml><?xml version="1.0" encoding="utf-8"?>
-<p:sld xmlns:a="http://schemas.openxmlformats.org/drawingml/2006/main" xmlns:r="http://schemas.openxmlformats.org/officeDocument/2006/relationships" xmlns:p="http://schemas.openxmlformats.org/presentationml/2006/main">
+<p:sld xmlns:a="http://schemas.openxmlformats.org/drawingml/2006/main" xmlns:r="http://schemas.openxmlformats.org/officeDocument/2006/relationships" xmlns:p="http://schemas.openxmlformats.org/presentationml/2006/main" show="0">
   <p:cSld>
     <p:spTree>
       <p:nvGrpSpPr>
@@ -8942,7 +9588,7 @@
                 <a:ea typeface="MS Mincho" panose="02020609040205080304" pitchFamily="49" charset="-128"/>
                 <a:cs typeface="Times New Roman" panose="02020603050405020304" pitchFamily="18" charset="0"/>
               </a:rPr>
-              <a:t>Investigate of correlation between price and income tax features reveals limited linear signal</a:t>
+              <a:t>Investigation of correlation between price and income tax features reveals limited linear signal</a:t>
             </a:r>
           </a:p>
         </p:txBody>
@@ -11898,7 +12544,7 @@
         <p:spPr>
           <a:xfrm>
             <a:off x="967946" y="3113903"/>
-            <a:ext cx="3484606" cy="1908215"/>
+            <a:ext cx="3484606" cy="1277273"/>
           </a:xfrm>
           <a:prstGeom prst="rect">
             <a:avLst/>
@@ -11960,38 +12606,6 @@
                 <a:cs typeface="Times New Roman" panose="02020603050405020304" pitchFamily="18" charset="0"/>
               </a:rPr>
               <a:t>eveloped a rough R framework for modeling</a:t>
-            </a:r>
-          </a:p>
-          <a:p>
-            <a:pPr marL="285750" indent="-285750">
-              <a:spcAft>
-                <a:spcPts val="600"/>
-              </a:spcAft>
-              <a:buFont typeface="Arial" panose="020B0604020202020204" pitchFamily="34" charset="0"/>
-              <a:buChar char="•"/>
-            </a:pPr>
-            <a:r>
-              <a:rPr lang="en-US" dirty="0">
-                <a:latin typeface="Calibri" panose="020F0502020204030204" pitchFamily="34" charset="0"/>
-                <a:ea typeface="MS Mincho" panose="02020609040205080304" pitchFamily="49" charset="-128"/>
-                <a:cs typeface="Times New Roman" panose="02020603050405020304" pitchFamily="18" charset="0"/>
-              </a:rPr>
-              <a:t>Trained initial</a:t>
-            </a:r>
-            <a:r>
-              <a:rPr lang="en-US" sz="1800" dirty="0">
-                <a:effectLst/>
-                <a:latin typeface="Calibri" panose="020F0502020204030204" pitchFamily="34" charset="0"/>
-                <a:ea typeface="MS Mincho" panose="02020609040205080304" pitchFamily="49" charset="-128"/>
-                <a:cs typeface="Times New Roman" panose="02020603050405020304" pitchFamily="18" charset="0"/>
-              </a:rPr>
-              <a:t> linear models as a point of reference</a:t>
-            </a:r>
-            <a:r>
-              <a:rPr lang="en-US" dirty="0">
-                <a:effectLst/>
-              </a:rPr>
-              <a:t> </a:t>
             </a:r>
             <a:endParaRPr lang="en-US" dirty="0"/>
           </a:p>
@@ -13361,7 +13975,7 @@
           <p:cNvPr id="2" name="Title 1">
             <a:extLst>
               <a:ext uri="{FF2B5EF4-FFF2-40B4-BE49-F238E27FC236}">
-                <a16:creationId xmlns:a16="http://schemas.microsoft.com/office/drawing/2014/main" id="{3A176D75-DC64-614F-9953-6D0B12CED564}"/>
+                <a16:creationId xmlns:a16="http://schemas.microsoft.com/office/drawing/2014/main" id="{75589658-D6F5-087A-BEB2-6340F1A65F93}"/>
               </a:ext>
             </a:extLst>
           </p:cNvPr>
@@ -13374,24 +13988,22 @@
         </p:nvSpPr>
         <p:spPr/>
         <p:txBody>
-          <a:bodyPr>
-            <a:normAutofit fontScale="90000"/>
-          </a:bodyPr>
+          <a:bodyPr/>
           <a:lstStyle/>
           <a:p>
             <a:r>
               <a:rPr lang="en-US" dirty="0"/>
-              <a:t>Initial Hypotheses</a:t>
+              <a:t>Next Steps</a:t>
             </a:r>
           </a:p>
         </p:txBody>
       </p:sp>
       <p:sp>
         <p:nvSpPr>
-          <p:cNvPr id="3" name="Content Placeholder 2">
+          <p:cNvPr id="3" name="Text Placeholder 2">
             <a:extLst>
               <a:ext uri="{FF2B5EF4-FFF2-40B4-BE49-F238E27FC236}">
-                <a16:creationId xmlns:a16="http://schemas.microsoft.com/office/drawing/2014/main" id="{1502AB30-D7ED-2114-8FCE-E4F5314021A1}"/>
+                <a16:creationId xmlns:a16="http://schemas.microsoft.com/office/drawing/2014/main" id="{D6F34192-6511-BC66-707F-DCB93BB09424}"/>
               </a:ext>
             </a:extLst>
           </p:cNvPr>
@@ -13399,311 +14011,22 @@
             <a:spLocks noGrp="1"/>
           </p:cNvSpPr>
           <p:nvPr>
-            <p:ph idx="1"/>
+            <p:ph type="body" idx="1"/>
           </p:nvPr>
         </p:nvSpPr>
         <p:spPr/>
         <p:txBody>
-          <a:bodyPr>
-            <a:normAutofit/>
-          </a:bodyPr>
+          <a:bodyPr/>
           <a:lstStyle/>
           <a:p>
-            <a:pPr marL="0" indent="0">
-              <a:buNone/>
-            </a:pPr>
-            <a:r>
-              <a:rPr lang="en-US" sz="2000" dirty="0"/>
-              <a:t>The team has a few hypotheses that we plan to test as we develop and evaluate our models.</a:t>
-            </a:r>
-          </a:p>
-          <a:p>
-            <a:pPr marL="0" indent="0">
-              <a:buNone/>
-            </a:pPr>
-            <a:endParaRPr lang="en-US" sz="2000" dirty="0"/>
-          </a:p>
-          <a:p>
-            <a:pPr marL="0" indent="0">
-              <a:buNone/>
-            </a:pPr>
-            <a:endParaRPr lang="en-US" sz="2000" dirty="0"/>
-          </a:p>
-          <a:p>
-            <a:pPr marL="466725" indent="-466725">
-              <a:spcAft>
-                <a:spcPts val="1800"/>
-              </a:spcAft>
-            </a:pPr>
-            <a:r>
-              <a:rPr lang="en-US" sz="2000" dirty="0"/>
-              <a:t>Real estate features are expected to provide the most signal to the model</a:t>
-            </a:r>
-          </a:p>
-          <a:p>
-            <a:pPr marL="466725" indent="-466725">
-              <a:spcAft>
-                <a:spcPts val="1800"/>
-              </a:spcAft>
-            </a:pPr>
-            <a:r>
-              <a:rPr lang="en-US" sz="2000" dirty="0">
-                <a:latin typeface="Calibri" panose="020F0502020204030204" pitchFamily="34" charset="0"/>
-                <a:ea typeface="MS Mincho" panose="02020609040205080304" pitchFamily="49" charset="-128"/>
-                <a:cs typeface="Times New Roman" panose="02020603050405020304" pitchFamily="18" charset="0"/>
-              </a:rPr>
-              <a:t>T</a:t>
-            </a:r>
-            <a:r>
-              <a:rPr lang="en-US" sz="2000" dirty="0">
-                <a:effectLst/>
-                <a:latin typeface="Calibri" panose="020F0502020204030204" pitchFamily="34" charset="0"/>
-                <a:ea typeface="MS Mincho" panose="02020609040205080304" pitchFamily="49" charset="-128"/>
-                <a:cs typeface="Times New Roman" panose="02020603050405020304" pitchFamily="18" charset="0"/>
-              </a:rPr>
-              <a:t>ax features related to affluency (AGI, taxable income amounts) have the most potential to provide signal to the model</a:t>
-            </a:r>
-          </a:p>
-          <a:p>
-            <a:pPr marL="466725" indent="-466725">
-              <a:spcAft>
-                <a:spcPts val="1800"/>
-              </a:spcAft>
-            </a:pPr>
-            <a:r>
-              <a:rPr lang="en-US" sz="2000" dirty="0">
-                <a:latin typeface="Calibri" panose="020F0502020204030204" pitchFamily="34" charset="0"/>
-                <a:ea typeface="MS Mincho" panose="02020609040205080304" pitchFamily="49" charset="-128"/>
-                <a:cs typeface="Times New Roman" panose="02020603050405020304" pitchFamily="18" charset="0"/>
-              </a:rPr>
-              <a:t>T</a:t>
-            </a:r>
-            <a:r>
-              <a:rPr lang="en-US" sz="2000" dirty="0">
-                <a:effectLst/>
-                <a:latin typeface="Calibri" panose="020F0502020204030204" pitchFamily="34" charset="0"/>
-                <a:ea typeface="MS Mincho" panose="02020609040205080304" pitchFamily="49" charset="-128"/>
-                <a:cs typeface="Times New Roman" panose="02020603050405020304" pitchFamily="18" charset="0"/>
-              </a:rPr>
-              <a:t>ree-based models will likely far outperform linear models due to their ability to pick up nonlinear signal and predictor interactions without explicit interaction terms</a:t>
-            </a:r>
-            <a:r>
-              <a:rPr lang="en-US" sz="2000" dirty="0">
-                <a:effectLst/>
-              </a:rPr>
-              <a:t> </a:t>
-            </a:r>
-            <a:endParaRPr lang="en-US" sz="2000" dirty="0"/>
-          </a:p>
-        </p:txBody>
-      </p:sp>
-      <p:sp>
-        <p:nvSpPr>
-          <p:cNvPr id="4" name="TextBox 3">
-            <a:extLst>
-              <a:ext uri="{FF2B5EF4-FFF2-40B4-BE49-F238E27FC236}">
-                <a16:creationId xmlns:a16="http://schemas.microsoft.com/office/drawing/2014/main" id="{B3B0A8F1-DF0B-4CA8-7887-D75024593553}"/>
-              </a:ext>
-            </a:extLst>
-          </p:cNvPr>
-          <p:cNvSpPr txBox="1"/>
-          <p:nvPr/>
-        </p:nvSpPr>
-        <p:spPr>
-          <a:xfrm>
-            <a:off x="4067503" y="1418897"/>
-            <a:ext cx="184731" cy="369332"/>
-          </a:xfrm>
-          <a:prstGeom prst="rect">
-            <a:avLst/>
-          </a:prstGeom>
-          <a:noFill/>
-        </p:spPr>
-        <p:txBody>
-          <a:bodyPr wrap="none" rtlCol="0">
-            <a:spAutoFit/>
-          </a:bodyPr>
-          <a:lstStyle/>
-          <a:p>
-            <a:endParaRPr lang="en-US" dirty="0"/>
-          </a:p>
-        </p:txBody>
-      </p:sp>
-      <p:sp>
-        <p:nvSpPr>
-          <p:cNvPr id="5" name="Oval 4">
-            <a:extLst>
-              <a:ext uri="{FF2B5EF4-FFF2-40B4-BE49-F238E27FC236}">
-                <a16:creationId xmlns:a16="http://schemas.microsoft.com/office/drawing/2014/main" id="{73EB8225-46FA-84EA-B27F-59AE8283BD4C}"/>
-              </a:ext>
-            </a:extLst>
-          </p:cNvPr>
-          <p:cNvSpPr/>
-          <p:nvPr/>
-        </p:nvSpPr>
-        <p:spPr>
-          <a:xfrm>
-            <a:off x="838200" y="3067664"/>
-            <a:ext cx="280219" cy="280219"/>
-          </a:xfrm>
-          <a:prstGeom prst="ellipse">
-            <a:avLst/>
-          </a:prstGeom>
-          <a:solidFill>
-            <a:schemeClr val="accent1">
-              <a:lumMod val="50000"/>
-            </a:schemeClr>
-          </a:solidFill>
-          <a:ln>
-            <a:noFill/>
-          </a:ln>
-        </p:spPr>
-        <p:style>
-          <a:lnRef idx="2">
-            <a:schemeClr val="accent1">
-              <a:shade val="50000"/>
-            </a:schemeClr>
-          </a:lnRef>
-          <a:fillRef idx="1">
-            <a:schemeClr val="accent1"/>
-          </a:fillRef>
-          <a:effectRef idx="0">
-            <a:schemeClr val="accent1"/>
-          </a:effectRef>
-          <a:fontRef idx="minor">
-            <a:schemeClr val="lt1"/>
-          </a:fontRef>
-        </p:style>
-        <p:txBody>
-          <a:bodyPr rtlCol="0" anchor="ctr"/>
-          <a:lstStyle/>
-          <a:p>
-            <a:pPr algn="ctr"/>
-            <a:r>
-              <a:rPr lang="en-US" sz="1600" dirty="0"/>
-              <a:t>1</a:t>
-            </a:r>
-          </a:p>
-        </p:txBody>
-      </p:sp>
-      <p:sp>
-        <p:nvSpPr>
-          <p:cNvPr id="8" name="Oval 7">
-            <a:extLst>
-              <a:ext uri="{FF2B5EF4-FFF2-40B4-BE49-F238E27FC236}">
-                <a16:creationId xmlns:a16="http://schemas.microsoft.com/office/drawing/2014/main" id="{AEA5EC39-95E8-DFB2-8DC5-04B563AA89AA}"/>
-              </a:ext>
-            </a:extLst>
-          </p:cNvPr>
-          <p:cNvSpPr/>
-          <p:nvPr/>
-        </p:nvSpPr>
-        <p:spPr>
-          <a:xfrm>
-            <a:off x="838200" y="3677264"/>
-            <a:ext cx="280219" cy="280219"/>
-          </a:xfrm>
-          <a:prstGeom prst="ellipse">
-            <a:avLst/>
-          </a:prstGeom>
-          <a:solidFill>
-            <a:schemeClr val="accent1">
-              <a:lumMod val="50000"/>
-            </a:schemeClr>
-          </a:solidFill>
-          <a:ln>
-            <a:noFill/>
-          </a:ln>
-        </p:spPr>
-        <p:style>
-          <a:lnRef idx="2">
-            <a:schemeClr val="accent1">
-              <a:shade val="50000"/>
-            </a:schemeClr>
-          </a:lnRef>
-          <a:fillRef idx="1">
-            <a:schemeClr val="accent1"/>
-          </a:fillRef>
-          <a:effectRef idx="0">
-            <a:schemeClr val="accent1"/>
-          </a:effectRef>
-          <a:fontRef idx="minor">
-            <a:schemeClr val="lt1"/>
-          </a:fontRef>
-        </p:style>
-        <p:txBody>
-          <a:bodyPr rtlCol="0" anchor="ctr"/>
-          <a:lstStyle/>
-          <a:p>
-            <a:pPr algn="ctr"/>
-            <a:r>
-              <a:rPr lang="en-US" sz="1600" dirty="0"/>
-              <a:t>2</a:t>
-            </a:r>
-          </a:p>
-        </p:txBody>
-      </p:sp>
-      <p:sp>
-        <p:nvSpPr>
-          <p:cNvPr id="9" name="Oval 8">
-            <a:extLst>
-              <a:ext uri="{FF2B5EF4-FFF2-40B4-BE49-F238E27FC236}">
-                <a16:creationId xmlns:a16="http://schemas.microsoft.com/office/drawing/2014/main" id="{34B65964-ED33-8DFB-04BA-22B5C69C4670}"/>
-              </a:ext>
-            </a:extLst>
-          </p:cNvPr>
-          <p:cNvSpPr/>
-          <p:nvPr/>
-        </p:nvSpPr>
-        <p:spPr>
-          <a:xfrm>
-            <a:off x="838200" y="4606415"/>
-            <a:ext cx="280219" cy="280219"/>
-          </a:xfrm>
-          <a:prstGeom prst="ellipse">
-            <a:avLst/>
-          </a:prstGeom>
-          <a:solidFill>
-            <a:schemeClr val="accent1">
-              <a:lumMod val="50000"/>
-            </a:schemeClr>
-          </a:solidFill>
-          <a:ln>
-            <a:noFill/>
-          </a:ln>
-        </p:spPr>
-        <p:style>
-          <a:lnRef idx="2">
-            <a:schemeClr val="accent1">
-              <a:shade val="50000"/>
-            </a:schemeClr>
-          </a:lnRef>
-          <a:fillRef idx="1">
-            <a:schemeClr val="accent1"/>
-          </a:fillRef>
-          <a:effectRef idx="0">
-            <a:schemeClr val="accent1"/>
-          </a:effectRef>
-          <a:fontRef idx="minor">
-            <a:schemeClr val="lt1"/>
-          </a:fontRef>
-        </p:style>
-        <p:txBody>
-          <a:bodyPr rtlCol="0" anchor="ctr"/>
-          <a:lstStyle/>
-          <a:p>
-            <a:pPr algn="ctr"/>
-            <a:r>
-              <a:rPr lang="en-US" sz="1600" dirty="0"/>
-              <a:t>3</a:t>
-            </a:r>
+            <a:endParaRPr lang="en-US"/>
           </a:p>
         </p:txBody>
       </p:sp>
     </p:spTree>
     <p:extLst>
       <p:ext uri="{BB962C8B-B14F-4D97-AF65-F5344CB8AC3E}">
-        <p14:creationId xmlns:p14="http://schemas.microsoft.com/office/powerpoint/2010/main" val="3334957126"/>
+        <p14:creationId xmlns:p14="http://schemas.microsoft.com/office/powerpoint/2010/main" val="805341651"/>
       </p:ext>
     </p:extLst>
   </p:cSld>
@@ -13735,7 +14058,7 @@
           <p:cNvPr id="2" name="Title 1">
             <a:extLst>
               <a:ext uri="{FF2B5EF4-FFF2-40B4-BE49-F238E27FC236}">
-                <a16:creationId xmlns:a16="http://schemas.microsoft.com/office/drawing/2014/main" id="{75589658-D6F5-087A-BEB2-6340F1A65F93}"/>
+                <a16:creationId xmlns:a16="http://schemas.microsoft.com/office/drawing/2014/main" id="{3A176D75-DC64-614F-9953-6D0B12CED564}"/>
               </a:ext>
             </a:extLst>
           </p:cNvPr>
@@ -13748,7 +14071,9 @@
         </p:nvSpPr>
         <p:spPr/>
         <p:txBody>
-          <a:bodyPr/>
+          <a:bodyPr>
+            <a:normAutofit fontScale="90000"/>
+          </a:bodyPr>
           <a:lstStyle/>
           <a:p>
             <a:r>
@@ -13760,10 +14085,10 @@
       </p:sp>
       <p:sp>
         <p:nvSpPr>
-          <p:cNvPr id="3" name="Text Placeholder 2">
+          <p:cNvPr id="3" name="Content Placeholder 2">
             <a:extLst>
               <a:ext uri="{FF2B5EF4-FFF2-40B4-BE49-F238E27FC236}">
-                <a16:creationId xmlns:a16="http://schemas.microsoft.com/office/drawing/2014/main" id="{D6F34192-6511-BC66-707F-DCB93BB09424}"/>
+                <a16:creationId xmlns:a16="http://schemas.microsoft.com/office/drawing/2014/main" id="{1502AB30-D7ED-2114-8FCE-E4F5314021A1}"/>
               </a:ext>
             </a:extLst>
           </p:cNvPr>
@@ -13771,22 +14096,134 @@
             <a:spLocks noGrp="1"/>
           </p:cNvSpPr>
           <p:nvPr>
-            <p:ph type="body" idx="1"/>
+            <p:ph idx="1"/>
           </p:nvPr>
         </p:nvSpPr>
-        <p:spPr/>
+        <p:spPr>
+          <a:xfrm>
+            <a:off x="838200" y="1825624"/>
+            <a:ext cx="10515600" cy="4896451"/>
+          </a:xfrm>
+        </p:spPr>
         <p:txBody>
-          <a:bodyPr/>
+          <a:bodyPr>
+            <a:normAutofit/>
+          </a:bodyPr>
           <a:lstStyle/>
           <a:p>
-            <a:endParaRPr lang="en-US"/>
+            <a:r>
+              <a:rPr lang="en-US" sz="2400" dirty="0"/>
+              <a:t>Finish EDA</a:t>
+            </a:r>
+          </a:p>
+          <a:p>
+            <a:pPr lvl="1"/>
+            <a:r>
+              <a:rPr lang="en-US" sz="2000" dirty="0"/>
+              <a:t>Make final decision on null values</a:t>
+            </a:r>
+          </a:p>
+          <a:p>
+            <a:pPr lvl="1">
+              <a:spcAft>
+                <a:spcPts val="1200"/>
+              </a:spcAft>
+            </a:pPr>
+            <a:r>
+              <a:rPr lang="en-US" sz="2000" dirty="0"/>
+              <a:t>Rerun analysis with real estate features</a:t>
+            </a:r>
+            <a:endParaRPr lang="en-US" sz="2400" dirty="0"/>
+          </a:p>
+          <a:p>
+            <a:r>
+              <a:rPr lang="en-US" sz="2400" dirty="0"/>
+              <a:t>Complete model development and selection</a:t>
+            </a:r>
+          </a:p>
+          <a:p>
+            <a:pPr lvl="1"/>
+            <a:r>
+              <a:rPr lang="en-US" sz="2000" dirty="0"/>
+              <a:t>Build out PCA and tree-based model code</a:t>
+            </a:r>
+          </a:p>
+          <a:p>
+            <a:pPr lvl="1"/>
+            <a:r>
+              <a:rPr lang="en-US" sz="2000" dirty="0"/>
+              <a:t>Run models, compare performance, and select the best</a:t>
+            </a:r>
+          </a:p>
+          <a:p>
+            <a:pPr lvl="1">
+              <a:spcAft>
+                <a:spcPts val="1200"/>
+              </a:spcAft>
+            </a:pPr>
+            <a:r>
+              <a:rPr lang="en-US" sz="2000" dirty="0"/>
+              <a:t>Run a final version of the best model type without income tax features</a:t>
+            </a:r>
+          </a:p>
+          <a:p>
+            <a:r>
+              <a:rPr lang="en-US" sz="2400" dirty="0"/>
+              <a:t>Evaluate outputs</a:t>
+            </a:r>
+          </a:p>
+          <a:p>
+            <a:pPr lvl="1"/>
+            <a:r>
+              <a:rPr lang="en-US" sz="2000" dirty="0"/>
+              <a:t>Examine performance of all models to understand overall predictive power</a:t>
+            </a:r>
+          </a:p>
+          <a:p>
+            <a:pPr lvl="1"/>
+            <a:r>
+              <a:rPr lang="en-US" sz="2000" dirty="0"/>
+              <a:t>Compare performance of model with and without income tax features to understand their additive predictive power</a:t>
+            </a:r>
+          </a:p>
+        </p:txBody>
+      </p:sp>
+      <p:sp>
+        <p:nvSpPr>
+          <p:cNvPr id="4" name="TextBox 3">
+            <a:extLst>
+              <a:ext uri="{FF2B5EF4-FFF2-40B4-BE49-F238E27FC236}">
+                <a16:creationId xmlns:a16="http://schemas.microsoft.com/office/drawing/2014/main" id="{B3B0A8F1-DF0B-4CA8-7887-D75024593553}"/>
+              </a:ext>
+            </a:extLst>
+          </p:cNvPr>
+          <p:cNvSpPr txBox="1"/>
+          <p:nvPr/>
+        </p:nvSpPr>
+        <p:spPr>
+          <a:xfrm>
+            <a:off x="4067503" y="1418897"/>
+            <a:ext cx="184731" cy="369332"/>
+          </a:xfrm>
+          <a:prstGeom prst="rect">
+            <a:avLst/>
+          </a:prstGeom>
+          <a:noFill/>
+        </p:spPr>
+        <p:txBody>
+          <a:bodyPr wrap="none" rtlCol="0">
+            <a:spAutoFit/>
+          </a:bodyPr>
+          <a:lstStyle/>
+          <a:p>
+            <a:endParaRPr lang="en-US" dirty="0"/>
           </a:p>
         </p:txBody>
       </p:sp>
     </p:spTree>
     <p:extLst>
       <p:ext uri="{BB962C8B-B14F-4D97-AF65-F5344CB8AC3E}">
-        <p14:creationId xmlns:p14="http://schemas.microsoft.com/office/powerpoint/2010/main" val="805341651"/>
+        <p14:creationId xmlns:p14="http://schemas.microsoft.com/office/powerpoint/2010/main" val="3876265857"/>
       </p:ext>
     </p:extLst>
   </p:cSld>
@@ -13838,17 +14275,17 @@
           <a:p>
             <a:r>
               <a:rPr lang="en-US" dirty="0"/>
-              <a:t>Next Steps</a:t>
+              <a:t>Literature Citations</a:t>
             </a:r>
           </a:p>
         </p:txBody>
       </p:sp>
       <p:sp>
         <p:nvSpPr>
-          <p:cNvPr id="3" name="Content Placeholder 2">
+          <p:cNvPr id="10" name="Content Placeholder 9">
             <a:extLst>
               <a:ext uri="{FF2B5EF4-FFF2-40B4-BE49-F238E27FC236}">
-                <a16:creationId xmlns:a16="http://schemas.microsoft.com/office/drawing/2014/main" id="{1502AB30-D7ED-2114-8FCE-E4F5314021A1}"/>
+                <a16:creationId xmlns:a16="http://schemas.microsoft.com/office/drawing/2014/main" id="{0C4DD2D7-D629-7801-E63B-0C8BD882FA28}"/>
               </a:ext>
             </a:extLst>
           </p:cNvPr>
@@ -13859,122 +14296,223 @@
             <p:ph idx="1"/>
           </p:nvPr>
         </p:nvSpPr>
-        <p:spPr>
-          <a:xfrm>
-            <a:off x="838200" y="1825624"/>
-            <a:ext cx="10515600" cy="4896451"/>
-          </a:xfrm>
-        </p:spPr>
+        <p:spPr/>
         <p:txBody>
-          <a:bodyPr>
-            <a:normAutofit/>
-          </a:bodyPr>
+          <a:bodyPr/>
           <a:lstStyle/>
           <a:p>
-            <a:r>
-              <a:rPr lang="en-US" sz="2400" dirty="0"/>
-              <a:t>Finish EDA</a:t>
-            </a:r>
-          </a:p>
-          <a:p>
-            <a:pPr lvl="1"/>
-            <a:r>
-              <a:rPr lang="en-US" sz="2000" dirty="0"/>
-              <a:t>Make final decision on null values</a:t>
-            </a:r>
-          </a:p>
-          <a:p>
-            <a:pPr lvl="1">
-              <a:spcAft>
-                <a:spcPts val="1200"/>
-              </a:spcAft>
+            <a:pPr marL="0" marR="0" indent="0">
+              <a:lnSpc>
+                <a:spcPct val="107000"/>
+              </a:lnSpc>
+              <a:spcBef>
+                <a:spcPts val="0"/>
+              </a:spcBef>
+              <a:buNone/>
             </a:pPr>
             <a:r>
-              <a:rPr lang="en-US" sz="2000" dirty="0"/>
-              <a:t>Rerun analysis with real estate features</a:t>
-            </a:r>
-            <a:endParaRPr lang="en-US" sz="2400" dirty="0"/>
-          </a:p>
-          <a:p>
-            <a:r>
-              <a:rPr lang="en-US" sz="2400" dirty="0"/>
-              <a:t>Complete model development and selection</a:t>
-            </a:r>
-          </a:p>
-          <a:p>
-            <a:pPr lvl="1"/>
-            <a:r>
-              <a:rPr lang="en-US" sz="2000" dirty="0"/>
-              <a:t>Build out PCA and tree-based model code</a:t>
-            </a:r>
-          </a:p>
-          <a:p>
-            <a:pPr lvl="1"/>
-            <a:r>
-              <a:rPr lang="en-US" sz="2000" dirty="0"/>
-              <a:t>Run models, compare performance, and select the best</a:t>
-            </a:r>
-          </a:p>
-          <a:p>
-            <a:pPr lvl="1">
-              <a:spcAft>
-                <a:spcPts val="1200"/>
-              </a:spcAft>
+              <a:rPr lang="en-US" sz="2800" dirty="0">
+                <a:effectLst/>
+                <a:latin typeface="Calibri" panose="020F0502020204030204" pitchFamily="34" charset="0"/>
+                <a:ea typeface="MS Mincho" panose="02020609040205080304" pitchFamily="49" charset="-128"/>
+                <a:cs typeface="Times New Roman" panose="02020603050405020304" pitchFamily="18" charset="0"/>
+              </a:rPr>
+              <a:t>[1] “Machine Learning based Predicting House Prices using Regression Techniques”; J </a:t>
+            </a:r>
+            <a:r>
+              <a:rPr lang="en-US" sz="2800" dirty="0" err="1">
+                <a:effectLst/>
+                <a:latin typeface="Calibri" panose="020F0502020204030204" pitchFamily="34" charset="0"/>
+                <a:ea typeface="MS Mincho" panose="02020609040205080304" pitchFamily="49" charset="-128"/>
+                <a:cs typeface="Times New Roman" panose="02020603050405020304" pitchFamily="18" charset="0"/>
+              </a:rPr>
+              <a:t>Manasa</a:t>
+            </a:r>
+            <a:r>
+              <a:rPr lang="en-US" sz="2800" dirty="0">
+                <a:effectLst/>
+                <a:latin typeface="Calibri" panose="020F0502020204030204" pitchFamily="34" charset="0"/>
+                <a:ea typeface="MS Mincho" panose="02020609040205080304" pitchFamily="49" charset="-128"/>
+                <a:cs typeface="Times New Roman" panose="02020603050405020304" pitchFamily="18" charset="0"/>
+              </a:rPr>
+              <a:t>, Radha </a:t>
+            </a:r>
+            <a:r>
+              <a:rPr lang="en-US" sz="2800" dirty="0" err="1">
+                <a:effectLst/>
+                <a:latin typeface="Calibri" panose="020F0502020204030204" pitchFamily="34" charset="0"/>
+                <a:ea typeface="MS Mincho" panose="02020609040205080304" pitchFamily="49" charset="-128"/>
+                <a:cs typeface="Times New Roman" panose="02020603050405020304" pitchFamily="18" charset="0"/>
+              </a:rPr>
+              <a:t>Guota</a:t>
+            </a:r>
+            <a:r>
+              <a:rPr lang="en-US" sz="2800" dirty="0">
+                <a:effectLst/>
+                <a:latin typeface="Calibri" panose="020F0502020204030204" pitchFamily="34" charset="0"/>
+                <a:ea typeface="MS Mincho" panose="02020609040205080304" pitchFamily="49" charset="-128"/>
+                <a:cs typeface="Times New Roman" panose="02020603050405020304" pitchFamily="18" charset="0"/>
+              </a:rPr>
+              <a:t>, N S </a:t>
+            </a:r>
+            <a:r>
+              <a:rPr lang="en-US" sz="2800" dirty="0" err="1">
+                <a:effectLst/>
+                <a:latin typeface="Calibri" panose="020F0502020204030204" pitchFamily="34" charset="0"/>
+                <a:ea typeface="MS Mincho" panose="02020609040205080304" pitchFamily="49" charset="-128"/>
+                <a:cs typeface="Times New Roman" panose="02020603050405020304" pitchFamily="18" charset="0"/>
+              </a:rPr>
+              <a:t>Narahari</a:t>
+            </a:r>
+            <a:r>
+              <a:rPr lang="en-US" sz="2800" dirty="0">
+                <a:effectLst/>
+                <a:latin typeface="Calibri" panose="020F0502020204030204" pitchFamily="34" charset="0"/>
+                <a:ea typeface="MS Mincho" panose="02020609040205080304" pitchFamily="49" charset="-128"/>
+                <a:cs typeface="Times New Roman" panose="02020603050405020304" pitchFamily="18" charset="0"/>
+              </a:rPr>
+              <a:t>; https://</a:t>
+            </a:r>
+            <a:r>
+              <a:rPr lang="en-US" sz="2800" dirty="0" err="1">
+                <a:effectLst/>
+                <a:latin typeface="Calibri" panose="020F0502020204030204" pitchFamily="34" charset="0"/>
+                <a:ea typeface="MS Mincho" panose="02020609040205080304" pitchFamily="49" charset="-128"/>
+                <a:cs typeface="Times New Roman" panose="02020603050405020304" pitchFamily="18" charset="0"/>
+              </a:rPr>
+              <a:t>ieeexplore.ieee.org</a:t>
+            </a:r>
+            <a:r>
+              <a:rPr lang="en-US" sz="2800" dirty="0">
+                <a:effectLst/>
+                <a:latin typeface="Calibri" panose="020F0502020204030204" pitchFamily="34" charset="0"/>
+                <a:ea typeface="MS Mincho" panose="02020609040205080304" pitchFamily="49" charset="-128"/>
+                <a:cs typeface="Times New Roman" panose="02020603050405020304" pitchFamily="18" charset="0"/>
+              </a:rPr>
+              <a:t>/abstract/document/9074952</a:t>
+            </a:r>
+            <a:endParaRPr lang="en-US" sz="2800" dirty="0">
+              <a:effectLst/>
+              <a:latin typeface="Calibri" panose="020F0502020204030204" pitchFamily="34" charset="0"/>
+              <a:ea typeface="Calibri" panose="020F0502020204030204" pitchFamily="34" charset="0"/>
+              <a:cs typeface="Times New Roman" panose="02020603050405020304" pitchFamily="18" charset="0"/>
+            </a:endParaRPr>
+          </a:p>
+          <a:p>
+            <a:pPr marL="0" marR="0" indent="0">
+              <a:lnSpc>
+                <a:spcPct val="107000"/>
+              </a:lnSpc>
+              <a:spcBef>
+                <a:spcPts val="0"/>
+              </a:spcBef>
+              <a:buNone/>
             </a:pPr>
-            <a:r>
-              <a:rPr lang="en-US" sz="2000" dirty="0"/>
-              <a:t>Run a final version of the best model type without income tax features</a:t>
-            </a:r>
-          </a:p>
-          <a:p>
-            <a:r>
-              <a:rPr lang="en-US" sz="2400" dirty="0"/>
-              <a:t>Evaluate outputs</a:t>
-            </a:r>
-          </a:p>
-          <a:p>
-            <a:pPr lvl="1"/>
-            <a:r>
-              <a:rPr lang="en-US" sz="2000" dirty="0"/>
-              <a:t>Examine performance of all models to understand overall predictive power</a:t>
-            </a:r>
-          </a:p>
-          <a:p>
-            <a:pPr lvl="1"/>
-            <a:r>
-              <a:rPr lang="en-US" sz="2000" dirty="0"/>
-              <a:t>Compare performance of model with and without income tax features to understand their additive predictive power</a:t>
-            </a:r>
-          </a:p>
-        </p:txBody>
-      </p:sp>
-      <p:sp>
-        <p:nvSpPr>
-          <p:cNvPr id="4" name="TextBox 3">
-            <a:extLst>
-              <a:ext uri="{FF2B5EF4-FFF2-40B4-BE49-F238E27FC236}">
-                <a16:creationId xmlns:a16="http://schemas.microsoft.com/office/drawing/2014/main" id="{B3B0A8F1-DF0B-4CA8-7887-D75024593553}"/>
-              </a:ext>
-            </a:extLst>
-          </p:cNvPr>
-          <p:cNvSpPr txBox="1"/>
-          <p:nvPr/>
-        </p:nvSpPr>
-        <p:spPr>
-          <a:xfrm>
-            <a:off x="4067503" y="1418897"/>
-            <a:ext cx="184731" cy="369332"/>
-          </a:xfrm>
-          <a:prstGeom prst="rect">
-            <a:avLst/>
-          </a:prstGeom>
-          <a:noFill/>
-        </p:spPr>
-        <p:txBody>
-          <a:bodyPr wrap="none" rtlCol="0">
-            <a:spAutoFit/>
-          </a:bodyPr>
-          <a:lstStyle/>
+            <a:endParaRPr lang="en-US" sz="2800" dirty="0">
+              <a:effectLst/>
+              <a:latin typeface="Calibri" panose="020F0502020204030204" pitchFamily="34" charset="0"/>
+              <a:ea typeface="MS Mincho" panose="02020609040205080304" pitchFamily="49" charset="-128"/>
+              <a:cs typeface="Times New Roman" panose="02020603050405020304" pitchFamily="18" charset="0"/>
+            </a:endParaRPr>
+          </a:p>
+          <a:p>
+            <a:pPr marL="0" marR="0" indent="0">
+              <a:lnSpc>
+                <a:spcPct val="107000"/>
+              </a:lnSpc>
+              <a:spcBef>
+                <a:spcPts val="0"/>
+              </a:spcBef>
+              <a:buNone/>
+            </a:pPr>
+            <a:r>
+              <a:rPr lang="en-US" sz="2800" dirty="0">
+                <a:effectLst/>
+                <a:latin typeface="Calibri" panose="020F0502020204030204" pitchFamily="34" charset="0"/>
+                <a:ea typeface="MS Mincho" panose="02020609040205080304" pitchFamily="49" charset="-128"/>
+                <a:cs typeface="Times New Roman" panose="02020603050405020304" pitchFamily="18" charset="0"/>
+              </a:rPr>
+              <a:t>[2] “Predicting House Prices with Spatial Dependence: A Comparison of Alternative Methods”; Steven Bourassa, Eva </a:t>
+            </a:r>
+            <a:r>
+              <a:rPr lang="en-US" sz="2800" dirty="0" err="1">
+                <a:effectLst/>
+                <a:latin typeface="Calibri" panose="020F0502020204030204" pitchFamily="34" charset="0"/>
+                <a:ea typeface="MS Mincho" panose="02020609040205080304" pitchFamily="49" charset="-128"/>
+                <a:cs typeface="Times New Roman" panose="02020603050405020304" pitchFamily="18" charset="0"/>
+              </a:rPr>
+              <a:t>Cantoni</a:t>
+            </a:r>
+            <a:r>
+              <a:rPr lang="en-US" sz="2800" dirty="0">
+                <a:effectLst/>
+                <a:latin typeface="Calibri" panose="020F0502020204030204" pitchFamily="34" charset="0"/>
+                <a:ea typeface="MS Mincho" panose="02020609040205080304" pitchFamily="49" charset="-128"/>
+                <a:cs typeface="Times New Roman" panose="02020603050405020304" pitchFamily="18" charset="0"/>
+              </a:rPr>
+              <a:t>, &amp; Martin </a:t>
+            </a:r>
+            <a:r>
+              <a:rPr lang="en-US" sz="2800" dirty="0" err="1">
+                <a:effectLst/>
+                <a:latin typeface="Calibri" panose="020F0502020204030204" pitchFamily="34" charset="0"/>
+                <a:ea typeface="MS Mincho" panose="02020609040205080304" pitchFamily="49" charset="-128"/>
+                <a:cs typeface="Times New Roman" panose="02020603050405020304" pitchFamily="18" charset="0"/>
+              </a:rPr>
+              <a:t>Hoesli</a:t>
+            </a:r>
+            <a:r>
+              <a:rPr lang="en-US" sz="2800" dirty="0">
+                <a:effectLst/>
+                <a:latin typeface="Calibri" panose="020F0502020204030204" pitchFamily="34" charset="0"/>
+                <a:ea typeface="MS Mincho" panose="02020609040205080304" pitchFamily="49" charset="-128"/>
+                <a:cs typeface="Times New Roman" panose="02020603050405020304" pitchFamily="18" charset="0"/>
+              </a:rPr>
+              <a:t>; https://</a:t>
+            </a:r>
+            <a:r>
+              <a:rPr lang="en-US" sz="2800" dirty="0" err="1">
+                <a:effectLst/>
+                <a:latin typeface="Calibri" panose="020F0502020204030204" pitchFamily="34" charset="0"/>
+                <a:ea typeface="MS Mincho" panose="02020609040205080304" pitchFamily="49" charset="-128"/>
+                <a:cs typeface="Times New Roman" panose="02020603050405020304" pitchFamily="18" charset="0"/>
+              </a:rPr>
+              <a:t>www.tandfonline.com</a:t>
+            </a:r>
+            <a:r>
+              <a:rPr lang="en-US" sz="2800" dirty="0">
+                <a:effectLst/>
+                <a:latin typeface="Calibri" panose="020F0502020204030204" pitchFamily="34" charset="0"/>
+                <a:ea typeface="MS Mincho" panose="02020609040205080304" pitchFamily="49" charset="-128"/>
+                <a:cs typeface="Times New Roman" panose="02020603050405020304" pitchFamily="18" charset="0"/>
+              </a:rPr>
+              <a:t>/</a:t>
+            </a:r>
+            <a:r>
+              <a:rPr lang="en-US" sz="2800" dirty="0" err="1">
+                <a:effectLst/>
+                <a:latin typeface="Calibri" panose="020F0502020204030204" pitchFamily="34" charset="0"/>
+                <a:ea typeface="MS Mincho" panose="02020609040205080304" pitchFamily="49" charset="-128"/>
+                <a:cs typeface="Times New Roman" panose="02020603050405020304" pitchFamily="18" charset="0"/>
+              </a:rPr>
+              <a:t>doi</a:t>
+            </a:r>
+            <a:r>
+              <a:rPr lang="en-US" sz="2800" dirty="0">
+                <a:effectLst/>
+                <a:latin typeface="Calibri" panose="020F0502020204030204" pitchFamily="34" charset="0"/>
+                <a:ea typeface="MS Mincho" panose="02020609040205080304" pitchFamily="49" charset="-128"/>
+                <a:cs typeface="Times New Roman" panose="02020603050405020304" pitchFamily="18" charset="0"/>
+              </a:rPr>
+              <a:t>/abs/10.1080/10835547.2010.12091276</a:t>
+            </a:r>
+            <a:endParaRPr lang="en-US" sz="2800" dirty="0">
+              <a:effectLst/>
+              <a:latin typeface="Calibri" panose="020F0502020204030204" pitchFamily="34" charset="0"/>
+              <a:ea typeface="Calibri" panose="020F0502020204030204" pitchFamily="34" charset="0"/>
+              <a:cs typeface="Times New Roman" panose="02020603050405020304" pitchFamily="18" charset="0"/>
+            </a:endParaRPr>
+          </a:p>
           <a:p>
             <a:endParaRPr lang="en-US" dirty="0"/>
           </a:p>
@@ -13983,7 +14521,7 @@
     </p:spTree>
     <p:extLst>
       <p:ext uri="{BB962C8B-B14F-4D97-AF65-F5344CB8AC3E}">
-        <p14:creationId xmlns:p14="http://schemas.microsoft.com/office/powerpoint/2010/main" val="3876265857"/>
+        <p14:creationId xmlns:p14="http://schemas.microsoft.com/office/powerpoint/2010/main" val="352101308"/>
       </p:ext>
     </p:extLst>
   </p:cSld>
@@ -14277,7 +14815,7 @@
         </p:nvSpPr>
         <p:spPr>
           <a:xfrm>
-            <a:off x="838200" y="4599016"/>
+            <a:off x="838200" y="4195360"/>
             <a:ext cx="10515600" cy="1375379"/>
           </a:xfrm>
           <a:prstGeom prst="rect">
@@ -14559,7 +15097,7 @@
         </p:nvSpPr>
         <p:spPr>
           <a:xfrm>
-            <a:off x="0" y="4172609"/>
+            <a:off x="0" y="3768953"/>
             <a:ext cx="12192000" cy="304800"/>
           </a:xfrm>
           <a:prstGeom prst="rect">
@@ -14602,6 +15140,267 @@
           </a:p>
         </p:txBody>
       </p:sp>
+      <p:sp>
+        <p:nvSpPr>
+          <p:cNvPr id="7" name="Rectangle 6">
+            <a:extLst>
+              <a:ext uri="{FF2B5EF4-FFF2-40B4-BE49-F238E27FC236}">
+                <a16:creationId xmlns:a16="http://schemas.microsoft.com/office/drawing/2014/main" id="{A786503D-1A74-BC11-CDA2-F6372C9C710B}"/>
+              </a:ext>
+            </a:extLst>
+          </p:cNvPr>
+          <p:cNvSpPr/>
+          <p:nvPr/>
+        </p:nvSpPr>
+        <p:spPr>
+          <a:xfrm>
+            <a:off x="0" y="5764499"/>
+            <a:ext cx="12192000" cy="304800"/>
+          </a:xfrm>
+          <a:prstGeom prst="rect">
+            <a:avLst/>
+          </a:prstGeom>
+          <a:solidFill>
+            <a:schemeClr val="tx2">
+              <a:lumMod val="60000"/>
+              <a:lumOff val="40000"/>
+            </a:schemeClr>
+          </a:solidFill>
+          <a:ln>
+            <a:noFill/>
+          </a:ln>
+        </p:spPr>
+        <p:style>
+          <a:lnRef idx="2">
+            <a:schemeClr val="accent1">
+              <a:shade val="50000"/>
+            </a:schemeClr>
+          </a:lnRef>
+          <a:fillRef idx="1">
+            <a:schemeClr val="accent1"/>
+          </a:fillRef>
+          <a:effectRef idx="0">
+            <a:schemeClr val="accent1"/>
+          </a:effectRef>
+          <a:fontRef idx="minor">
+            <a:schemeClr val="lt1"/>
+          </a:fontRef>
+        </p:style>
+        <p:txBody>
+          <a:bodyPr rtlCol="0" anchor="ctr"/>
+          <a:lstStyle/>
+          <a:p>
+            <a:r>
+              <a:rPr lang="en-US" dirty="0"/>
+              <a:t>LITERATURE SURVEY</a:t>
+            </a:r>
+          </a:p>
+        </p:txBody>
+      </p:sp>
+      <p:sp>
+        <p:nvSpPr>
+          <p:cNvPr id="8" name="Content Placeholder 2">
+            <a:extLst>
+              <a:ext uri="{FF2B5EF4-FFF2-40B4-BE49-F238E27FC236}">
+                <a16:creationId xmlns:a16="http://schemas.microsoft.com/office/drawing/2014/main" id="{880CB66E-48B2-7627-761C-ACFA78D8EF6F}"/>
+              </a:ext>
+            </a:extLst>
+          </p:cNvPr>
+          <p:cNvSpPr txBox="1">
+            <a:spLocks/>
+          </p:cNvSpPr>
+          <p:nvPr/>
+        </p:nvSpPr>
+        <p:spPr>
+          <a:xfrm>
+            <a:off x="838200" y="6125253"/>
+            <a:ext cx="10515600" cy="658605"/>
+          </a:xfrm>
+          <a:prstGeom prst="rect">
+            <a:avLst/>
+          </a:prstGeom>
+        </p:spPr>
+        <p:txBody>
+          <a:bodyPr vert="horz" lIns="91440" tIns="45720" rIns="91440" bIns="45720" rtlCol="0">
+            <a:normAutofit/>
+          </a:bodyPr>
+          <a:lstStyle>
+            <a:lvl1pPr marL="228600" indent="-228600" algn="l" defTabSz="914400" rtl="0" eaLnBrk="1" latinLnBrk="0" hangingPunct="1">
+              <a:lnSpc>
+                <a:spcPct val="90000"/>
+              </a:lnSpc>
+              <a:spcBef>
+                <a:spcPts val="1000"/>
+              </a:spcBef>
+              <a:buFont typeface="Arial" panose="020B0604020202020204" pitchFamily="34" charset="0"/>
+              <a:buChar char="•"/>
+              <a:defRPr sz="2800" kern="1200">
+                <a:solidFill>
+                  <a:schemeClr val="tx1"/>
+                </a:solidFill>
+                <a:latin typeface="+mn-lt"/>
+                <a:ea typeface="+mn-ea"/>
+                <a:cs typeface="+mn-cs"/>
+              </a:defRPr>
+            </a:lvl1pPr>
+            <a:lvl2pPr marL="685800" indent="-228600" algn="l" defTabSz="914400" rtl="0" eaLnBrk="1" latinLnBrk="0" hangingPunct="1">
+              <a:lnSpc>
+                <a:spcPct val="90000"/>
+              </a:lnSpc>
+              <a:spcBef>
+                <a:spcPts val="500"/>
+              </a:spcBef>
+              <a:buFont typeface="Arial" panose="020B0604020202020204" pitchFamily="34" charset="0"/>
+              <a:buChar char="•"/>
+              <a:defRPr sz="2400" kern="1200">
+                <a:solidFill>
+                  <a:schemeClr val="tx1"/>
+                </a:solidFill>
+                <a:latin typeface="+mn-lt"/>
+                <a:ea typeface="+mn-ea"/>
+                <a:cs typeface="+mn-cs"/>
+              </a:defRPr>
+            </a:lvl2pPr>
+            <a:lvl3pPr marL="1143000" indent="-228600" algn="l" defTabSz="914400" rtl="0" eaLnBrk="1" latinLnBrk="0" hangingPunct="1">
+              <a:lnSpc>
+                <a:spcPct val="90000"/>
+              </a:lnSpc>
+              <a:spcBef>
+                <a:spcPts val="500"/>
+              </a:spcBef>
+              <a:buFont typeface="Arial" panose="020B0604020202020204" pitchFamily="34" charset="0"/>
+              <a:buChar char="•"/>
+              <a:defRPr sz="2000" kern="1200">
+                <a:solidFill>
+                  <a:schemeClr val="tx1"/>
+                </a:solidFill>
+                <a:latin typeface="+mn-lt"/>
+                <a:ea typeface="+mn-ea"/>
+                <a:cs typeface="+mn-cs"/>
+              </a:defRPr>
+            </a:lvl3pPr>
+            <a:lvl4pPr marL="1600200" indent="-228600" algn="l" defTabSz="914400" rtl="0" eaLnBrk="1" latinLnBrk="0" hangingPunct="1">
+              <a:lnSpc>
+                <a:spcPct val="90000"/>
+              </a:lnSpc>
+              <a:spcBef>
+                <a:spcPts val="500"/>
+              </a:spcBef>
+              <a:buFont typeface="Arial" panose="020B0604020202020204" pitchFamily="34" charset="0"/>
+              <a:buChar char="•"/>
+              <a:defRPr sz="1800" kern="1200">
+                <a:solidFill>
+                  <a:schemeClr val="tx1"/>
+                </a:solidFill>
+                <a:latin typeface="+mn-lt"/>
+                <a:ea typeface="+mn-ea"/>
+                <a:cs typeface="+mn-cs"/>
+              </a:defRPr>
+            </a:lvl4pPr>
+            <a:lvl5pPr marL="2057400" indent="-228600" algn="l" defTabSz="914400" rtl="0" eaLnBrk="1" latinLnBrk="0" hangingPunct="1">
+              <a:lnSpc>
+                <a:spcPct val="90000"/>
+              </a:lnSpc>
+              <a:spcBef>
+                <a:spcPts val="500"/>
+              </a:spcBef>
+              <a:buFont typeface="Arial" panose="020B0604020202020204" pitchFamily="34" charset="0"/>
+              <a:buChar char="•"/>
+              <a:defRPr sz="1800" kern="1200">
+                <a:solidFill>
+                  <a:schemeClr val="tx1"/>
+                </a:solidFill>
+                <a:latin typeface="+mn-lt"/>
+                <a:ea typeface="+mn-ea"/>
+                <a:cs typeface="+mn-cs"/>
+              </a:defRPr>
+            </a:lvl5pPr>
+            <a:lvl6pPr marL="2514600" indent="-228600" algn="l" defTabSz="914400" rtl="0" eaLnBrk="1" latinLnBrk="0" hangingPunct="1">
+              <a:lnSpc>
+                <a:spcPct val="90000"/>
+              </a:lnSpc>
+              <a:spcBef>
+                <a:spcPts val="500"/>
+              </a:spcBef>
+              <a:buFont typeface="Arial" panose="020B0604020202020204" pitchFamily="34" charset="0"/>
+              <a:buChar char="•"/>
+              <a:defRPr sz="1800" kern="1200">
+                <a:solidFill>
+                  <a:schemeClr val="tx1"/>
+                </a:solidFill>
+                <a:latin typeface="+mn-lt"/>
+                <a:ea typeface="+mn-ea"/>
+                <a:cs typeface="+mn-cs"/>
+              </a:defRPr>
+            </a:lvl6pPr>
+            <a:lvl7pPr marL="2971800" indent="-228600" algn="l" defTabSz="914400" rtl="0" eaLnBrk="1" latinLnBrk="0" hangingPunct="1">
+              <a:lnSpc>
+                <a:spcPct val="90000"/>
+              </a:lnSpc>
+              <a:spcBef>
+                <a:spcPts val="500"/>
+              </a:spcBef>
+              <a:buFont typeface="Arial" panose="020B0604020202020204" pitchFamily="34" charset="0"/>
+              <a:buChar char="•"/>
+              <a:defRPr sz="1800" kern="1200">
+                <a:solidFill>
+                  <a:schemeClr val="tx1"/>
+                </a:solidFill>
+                <a:latin typeface="+mn-lt"/>
+                <a:ea typeface="+mn-ea"/>
+                <a:cs typeface="+mn-cs"/>
+              </a:defRPr>
+            </a:lvl7pPr>
+            <a:lvl8pPr marL="3429000" indent="-228600" algn="l" defTabSz="914400" rtl="0" eaLnBrk="1" latinLnBrk="0" hangingPunct="1">
+              <a:lnSpc>
+                <a:spcPct val="90000"/>
+              </a:lnSpc>
+              <a:spcBef>
+                <a:spcPts val="500"/>
+              </a:spcBef>
+              <a:buFont typeface="Arial" panose="020B0604020202020204" pitchFamily="34" charset="0"/>
+              <a:buChar char="•"/>
+              <a:defRPr sz="1800" kern="1200">
+                <a:solidFill>
+                  <a:schemeClr val="tx1"/>
+                </a:solidFill>
+                <a:latin typeface="+mn-lt"/>
+                <a:ea typeface="+mn-ea"/>
+                <a:cs typeface="+mn-cs"/>
+              </a:defRPr>
+            </a:lvl8pPr>
+            <a:lvl9pPr marL="3886200" indent="-228600" algn="l" defTabSz="914400" rtl="0" eaLnBrk="1" latinLnBrk="0" hangingPunct="1">
+              <a:lnSpc>
+                <a:spcPct val="90000"/>
+              </a:lnSpc>
+              <a:spcBef>
+                <a:spcPts val="500"/>
+              </a:spcBef>
+              <a:buFont typeface="Arial" panose="020B0604020202020204" pitchFamily="34" charset="0"/>
+              <a:buChar char="•"/>
+              <a:defRPr sz="1800" kern="1200">
+                <a:solidFill>
+                  <a:schemeClr val="tx1"/>
+                </a:solidFill>
+                <a:latin typeface="+mn-lt"/>
+                <a:ea typeface="+mn-ea"/>
+                <a:cs typeface="+mn-cs"/>
+              </a:defRPr>
+            </a:lvl9pPr>
+          </a:lstStyle>
+          <a:p>
+            <a:pPr marL="0" indent="0">
+              <a:buFont typeface="Arial" panose="020B0604020202020204" pitchFamily="34" charset="0"/>
+              <a:buNone/>
+            </a:pPr>
+            <a:r>
+              <a:rPr lang="en-US" sz="2000"/>
+              <a:t>Existing attempts to incorporate zip code or location primarily focus on directly encoding the spatial data, but don’t account for affluency or income tax features</a:t>
+            </a:r>
+            <a:endParaRPr lang="en-US" sz="2000" dirty="0"/>
+          </a:p>
+        </p:txBody>
+      </p:sp>
     </p:spTree>
     <p:extLst>
       <p:ext uri="{BB962C8B-B14F-4D97-AF65-F5344CB8AC3E}">
@@ -14616,7 +15415,7 @@
 </file>
 
 <file path=ppt/slides/slide5.xml><?xml version="1.0" encoding="utf-8"?>
-<p:sld xmlns:a="http://schemas.openxmlformats.org/drawingml/2006/main" xmlns:r="http://schemas.openxmlformats.org/officeDocument/2006/relationships" xmlns:p="http://schemas.openxmlformats.org/presentationml/2006/main">
+<p:sld xmlns:a="http://schemas.openxmlformats.org/drawingml/2006/main" xmlns:r="http://schemas.openxmlformats.org/officeDocument/2006/relationships" xmlns:p="http://schemas.openxmlformats.org/presentationml/2006/main" show="0">
   <p:cSld>
     <p:spTree>
       <p:nvGrpSpPr>
@@ -15171,7 +15970,7 @@
 </file>
 
 <file path=ppt/slides/slide6.xml><?xml version="1.0" encoding="utf-8"?>
-<p:sld xmlns:a="http://schemas.openxmlformats.org/drawingml/2006/main" xmlns:r="http://schemas.openxmlformats.org/officeDocument/2006/relationships" xmlns:p="http://schemas.openxmlformats.org/presentationml/2006/main">
+<p:sld xmlns:a="http://schemas.openxmlformats.org/drawingml/2006/main" xmlns:r="http://schemas.openxmlformats.org/officeDocument/2006/relationships" xmlns:p="http://schemas.openxmlformats.org/presentationml/2006/main" show="0">
   <p:cSld>
     <p:spTree>
       <p:nvGrpSpPr>
@@ -17307,7 +18106,7 @@
           <a:p>
             <a:r>
               <a:rPr lang="en-US" dirty="0"/>
-              <a:t>Progress to Date</a:t>
+              <a:t>3 - Progress to Date</a:t>
             </a:r>
           </a:p>
         </p:txBody>
@@ -17643,4 +18442,299 @@
     </a:ext>
   </a:extLst>
 </a:theme>
+</file>
+
+<file path=ppt/theme/theme2.xml><?xml version="1.0" encoding="utf-8"?>
+<a:theme xmlns:a="http://schemas.openxmlformats.org/drawingml/2006/main" name="Office Theme">
+  <a:themeElements>
+    <a:clrScheme name="Office">
+      <a:dk1>
+        <a:sysClr val="windowText" lastClr="000000"/>
+      </a:dk1>
+      <a:lt1>
+        <a:sysClr val="window" lastClr="FFFFFF"/>
+      </a:lt1>
+      <a:dk2>
+        <a:srgbClr val="44546A"/>
+      </a:dk2>
+      <a:lt2>
+        <a:srgbClr val="E7E6E6"/>
+      </a:lt2>
+      <a:accent1>
+        <a:srgbClr val="4472C4"/>
+      </a:accent1>
+      <a:accent2>
+        <a:srgbClr val="ED7D31"/>
+      </a:accent2>
+      <a:accent3>
+        <a:srgbClr val="A5A5A5"/>
+      </a:accent3>
+      <a:accent4>
+        <a:srgbClr val="FFC000"/>
+      </a:accent4>
+      <a:accent5>
+        <a:srgbClr val="5B9BD5"/>
+      </a:accent5>
+      <a:accent6>
+        <a:srgbClr val="70AD47"/>
+      </a:accent6>
+      <a:hlink>
+        <a:srgbClr val="0563C1"/>
+      </a:hlink>
+      <a:folHlink>
+        <a:srgbClr val="954F72"/>
+      </a:folHlink>
+    </a:clrScheme>
+    <a:fontScheme name="Office">
+      <a:majorFont>
+        <a:latin typeface="Calibri Light" panose="020F0302020204030204"/>
+        <a:ea typeface=""/>
+        <a:cs typeface=""/>
+        <a:font script="Jpan" typeface="游ゴシック Light"/>
+        <a:font script="Hang" typeface="맑은 고딕"/>
+        <a:font script="Hans" typeface="等线 Light"/>
+        <a:font script="Hant" typeface="新細明體"/>
+        <a:font script="Arab" typeface="Times New Roman"/>
+        <a:font script="Hebr" typeface="Times New Roman"/>
+        <a:font script="Thai" typeface="Angsana New"/>
+        <a:font script="Ethi" typeface="Nyala"/>
+        <a:font script="Beng" typeface="Vrinda"/>
+        <a:font script="Gujr" typeface="Shruti"/>
+        <a:font script="Khmr" typeface="MoolBoran"/>
+        <a:font script="Knda" typeface="Tunga"/>
+        <a:font script="Guru" typeface="Raavi"/>
+        <a:font script="Cans" typeface="Euphemia"/>
+        <a:font script="Cher" typeface="Plantagenet Cherokee"/>
+        <a:font script="Yiii" typeface="Microsoft Yi Baiti"/>
+        <a:font script="Tibt" typeface="Microsoft Himalaya"/>
+        <a:font script="Thaa" typeface="MV Boli"/>
+        <a:font script="Deva" typeface="Mangal"/>
+        <a:font script="Telu" typeface="Gautami"/>
+        <a:font script="Taml" typeface="Latha"/>
+        <a:font script="Syrc" typeface="Estrangelo Edessa"/>
+        <a:font script="Orya" typeface="Kalinga"/>
+        <a:font script="Mlym" typeface="Kartika"/>
+        <a:font script="Laoo" typeface="DokChampa"/>
+        <a:font script="Sinh" typeface="Iskoola Pota"/>
+        <a:font script="Mong" typeface="Mongolian Baiti"/>
+        <a:font script="Viet" typeface="Times New Roman"/>
+        <a:font script="Uigh" typeface="Microsoft Uighur"/>
+        <a:font script="Geor" typeface="Sylfaen"/>
+        <a:font script="Armn" typeface="Arial"/>
+        <a:font script="Bugi" typeface="Leelawadee UI"/>
+        <a:font script="Bopo" typeface="Microsoft JhengHei"/>
+        <a:font script="Java" typeface="Javanese Text"/>
+        <a:font script="Lisu" typeface="Segoe UI"/>
+        <a:font script="Mymr" typeface="Myanmar Text"/>
+        <a:font script="Nkoo" typeface="Ebrima"/>
+        <a:font script="Olck" typeface="Nirmala UI"/>
+        <a:font script="Osma" typeface="Ebrima"/>
+        <a:font script="Phag" typeface="Phagspa"/>
+        <a:font script="Syrn" typeface="Estrangelo Edessa"/>
+        <a:font script="Syrj" typeface="Estrangelo Edessa"/>
+        <a:font script="Syre" typeface="Estrangelo Edessa"/>
+        <a:font script="Sora" typeface="Nirmala UI"/>
+        <a:font script="Tale" typeface="Microsoft Tai Le"/>
+        <a:font script="Talu" typeface="Microsoft New Tai Lue"/>
+        <a:font script="Tfng" typeface="Ebrima"/>
+      </a:majorFont>
+      <a:minorFont>
+        <a:latin typeface="Calibri" panose="020F0502020204030204"/>
+        <a:ea typeface=""/>
+        <a:cs typeface=""/>
+        <a:font script="Jpan" typeface="游ゴシック"/>
+        <a:font script="Hang" typeface="맑은 고딕"/>
+        <a:font script="Hans" typeface="等线"/>
+        <a:font script="Hant" typeface="新細明體"/>
+        <a:font script="Arab" typeface="Arial"/>
+        <a:font script="Hebr" typeface="Arial"/>
+        <a:font script="Thai" typeface="Cordia New"/>
+        <a:font script="Ethi" typeface="Nyala"/>
+        <a:font script="Beng" typeface="Vrinda"/>
+        <a:font script="Gujr" typeface="Shruti"/>
+        <a:font script="Khmr" typeface="DaunPenh"/>
+        <a:font script="Knda" typeface="Tunga"/>
+        <a:font script="Guru" typeface="Raavi"/>
+        <a:font script="Cans" typeface="Euphemia"/>
+        <a:font script="Cher" typeface="Plantagenet Cherokee"/>
+        <a:font script="Yiii" typeface="Microsoft Yi Baiti"/>
+        <a:font script="Tibt" typeface="Microsoft Himalaya"/>
+        <a:font script="Thaa" typeface="MV Boli"/>
+        <a:font script="Deva" typeface="Mangal"/>
+        <a:font script="Telu" typeface="Gautami"/>
+        <a:font script="Taml" typeface="Latha"/>
+        <a:font script="Syrc" typeface="Estrangelo Edessa"/>
+        <a:font script="Orya" typeface="Kalinga"/>
+        <a:font script="Mlym" typeface="Kartika"/>
+        <a:font script="Laoo" typeface="DokChampa"/>
+        <a:font script="Sinh" typeface="Iskoola Pota"/>
+        <a:font script="Mong" typeface="Mongolian Baiti"/>
+        <a:font script="Viet" typeface="Arial"/>
+        <a:font script="Uigh" typeface="Microsoft Uighur"/>
+        <a:font script="Geor" typeface="Sylfaen"/>
+        <a:font script="Armn" typeface="Arial"/>
+        <a:font script="Bugi" typeface="Leelawadee UI"/>
+        <a:font script="Bopo" typeface="Microsoft JhengHei"/>
+        <a:font script="Java" typeface="Javanese Text"/>
+        <a:font script="Lisu" typeface="Segoe UI"/>
+        <a:font script="Mymr" typeface="Myanmar Text"/>
+        <a:font script="Nkoo" typeface="Ebrima"/>
+        <a:font script="Olck" typeface="Nirmala UI"/>
+        <a:font script="Osma" typeface="Ebrima"/>
+        <a:font script="Phag" typeface="Phagspa"/>
+        <a:font script="Syrn" typeface="Estrangelo Edessa"/>
+        <a:font script="Syrj" typeface="Estrangelo Edessa"/>
+        <a:font script="Syre" typeface="Estrangelo Edessa"/>
+        <a:font script="Sora" typeface="Nirmala UI"/>
+        <a:font script="Tale" typeface="Microsoft Tai Le"/>
+        <a:font script="Talu" typeface="Microsoft New Tai Lue"/>
+        <a:font script="Tfng" typeface="Ebrima"/>
+      </a:minorFont>
+    </a:fontScheme>
+    <a:fmtScheme name="Office">
+      <a:fillStyleLst>
+        <a:solidFill>
+          <a:schemeClr val="phClr"/>
+        </a:solidFill>
+        <a:gradFill rotWithShape="1">
+          <a:gsLst>
+            <a:gs pos="0">
+              <a:schemeClr val="phClr">
+                <a:lumMod val="110000"/>
+                <a:satMod val="105000"/>
+                <a:tint val="67000"/>
+              </a:schemeClr>
+            </a:gs>
+            <a:gs pos="50000">
+              <a:schemeClr val="phClr">
+                <a:lumMod val="105000"/>
+                <a:satMod val="103000"/>
+                <a:tint val="73000"/>
+              </a:schemeClr>
+            </a:gs>
+            <a:gs pos="100000">
+              <a:schemeClr val="phClr">
+                <a:lumMod val="105000"/>
+                <a:satMod val="109000"/>
+                <a:tint val="81000"/>
+              </a:schemeClr>
+            </a:gs>
+          </a:gsLst>
+          <a:lin ang="5400000" scaled="0"/>
+        </a:gradFill>
+        <a:gradFill rotWithShape="1">
+          <a:gsLst>
+            <a:gs pos="0">
+              <a:schemeClr val="phClr">
+                <a:satMod val="103000"/>
+                <a:lumMod val="102000"/>
+                <a:tint val="94000"/>
+              </a:schemeClr>
+            </a:gs>
+            <a:gs pos="50000">
+              <a:schemeClr val="phClr">
+                <a:satMod val="110000"/>
+                <a:lumMod val="100000"/>
+                <a:shade val="100000"/>
+              </a:schemeClr>
+            </a:gs>
+            <a:gs pos="100000">
+              <a:schemeClr val="phClr">
+                <a:lumMod val="99000"/>
+                <a:satMod val="120000"/>
+                <a:shade val="78000"/>
+              </a:schemeClr>
+            </a:gs>
+          </a:gsLst>
+          <a:lin ang="5400000" scaled="0"/>
+        </a:gradFill>
+      </a:fillStyleLst>
+      <a:lnStyleLst>
+        <a:ln w="6350" cap="flat" cmpd="sng" algn="ctr">
+          <a:solidFill>
+            <a:schemeClr val="phClr"/>
+          </a:solidFill>
+          <a:prstDash val="solid"/>
+          <a:miter lim="800000"/>
+        </a:ln>
+        <a:ln w="12700" cap="flat" cmpd="sng" algn="ctr">
+          <a:solidFill>
+            <a:schemeClr val="phClr"/>
+          </a:solidFill>
+          <a:prstDash val="solid"/>
+          <a:miter lim="800000"/>
+        </a:ln>
+        <a:ln w="19050" cap="flat" cmpd="sng" algn="ctr">
+          <a:solidFill>
+            <a:schemeClr val="phClr"/>
+          </a:solidFill>
+          <a:prstDash val="solid"/>
+          <a:miter lim="800000"/>
+        </a:ln>
+      </a:lnStyleLst>
+      <a:effectStyleLst>
+        <a:effectStyle>
+          <a:effectLst/>
+        </a:effectStyle>
+        <a:effectStyle>
+          <a:effectLst/>
+        </a:effectStyle>
+        <a:effectStyle>
+          <a:effectLst>
+            <a:outerShdw blurRad="57150" dist="19050" dir="5400000" algn="ctr" rotWithShape="0">
+              <a:srgbClr val="000000">
+                <a:alpha val="63000"/>
+              </a:srgbClr>
+            </a:outerShdw>
+          </a:effectLst>
+        </a:effectStyle>
+      </a:effectStyleLst>
+      <a:bgFillStyleLst>
+        <a:solidFill>
+          <a:schemeClr val="phClr"/>
+        </a:solidFill>
+        <a:solidFill>
+          <a:schemeClr val="phClr">
+            <a:tint val="95000"/>
+            <a:satMod val="170000"/>
+          </a:schemeClr>
+        </a:solidFill>
+        <a:gradFill rotWithShape="1">
+          <a:gsLst>
+            <a:gs pos="0">
+              <a:schemeClr val="phClr">
+                <a:tint val="93000"/>
+                <a:satMod val="150000"/>
+                <a:shade val="98000"/>
+                <a:lumMod val="102000"/>
+              </a:schemeClr>
+            </a:gs>
+            <a:gs pos="50000">
+              <a:schemeClr val="phClr">
+                <a:tint val="98000"/>
+                <a:satMod val="130000"/>
+                <a:shade val="90000"/>
+                <a:lumMod val="103000"/>
+              </a:schemeClr>
+            </a:gs>
+            <a:gs pos="100000">
+              <a:schemeClr val="phClr">
+                <a:shade val="63000"/>
+                <a:satMod val="120000"/>
+              </a:schemeClr>
+            </a:gs>
+          </a:gsLst>
+          <a:lin ang="5400000" scaled="0"/>
+        </a:gradFill>
+      </a:bgFillStyleLst>
+    </a:fmtScheme>
+  </a:themeElements>
+  <a:objectDefaults/>
+  <a:extraClrSchemeLst/>
+  <a:extLst>
+    <a:ext uri="{05A4C25C-085E-4340-85A3-A5531E510DB2}">
+      <thm15:themeFamily xmlns:thm15="http://schemas.microsoft.com/office/thememl/2012/main" name="Office Theme" id="{62F939B6-93AF-4DB8-9C6B-D6C7DFDC589F}" vid="{4A3C46E8-61CC-4603-A589-7422A47A8E4A}"/>
+    </a:ext>
+  </a:extLst>
+</a:theme>
 </file>
</xml_diff>